<commit_message>
small changes to product features
</commit_message>
<xml_diff>
--- a/Proposal.pptx
+++ b/Proposal.pptx
@@ -512,7 +512,15 @@
           <a:p>
             <a:r>
               <a:rPr lang="en-US" dirty="0" smtClean="0"/>
-              <a:t>The idea of giving a rate to tutors</a:t>
+              <a:t>The idea of giving a </a:t>
+            </a:r>
+            <a:r>
+              <a:rPr lang="en-US" dirty="0" smtClean="0"/>
+              <a:t>rating </a:t>
+            </a:r>
+            <a:r>
+              <a:rPr lang="en-US" dirty="0" smtClean="0"/>
+              <a:t>to tutors</a:t>
             </a:r>
             <a:r>
               <a:rPr lang="en-US" baseline="0" dirty="0" smtClean="0"/>
@@ -15202,7 +15210,15 @@
             </a:r>
             <a:r>
               <a:rPr lang="en-US" sz="2400" dirty="0" smtClean="0"/>
-              <a:t>will be able to ask question uploading a picture and a line of text specifying the question.</a:t>
+              <a:t>will be able to ask </a:t>
+            </a:r>
+            <a:r>
+              <a:rPr lang="en-US" sz="2400" dirty="0" smtClean="0"/>
+              <a:t>questions by uploading </a:t>
+            </a:r>
+            <a:r>
+              <a:rPr lang="en-US" sz="2400" dirty="0" smtClean="0"/>
+              <a:t>a picture and a line of text specifying the question.</a:t>
             </a:r>
           </a:p>
           <a:p>
@@ -15225,15 +15241,7 @@
             <a:pPr lvl="2"/>
             <a:r>
               <a:rPr lang="en-US" sz="2000" dirty="0" smtClean="0"/>
-              <a:t>Tutor: registered college students or teachers.  Tutors will have contact information (location and email</a:t>
-            </a:r>
-            <a:r>
-              <a:rPr lang="en-US" sz="2000" smtClean="0"/>
-              <a:t>) and a </a:t>
-            </a:r>
-            <a:r>
-              <a:rPr lang="en-US" sz="2000" dirty="0" smtClean="0"/>
-              <a:t>rate.</a:t>
+              <a:t>Tutor: registered college students or teachers.  Tutors will have contact information (location and email) and a rate.</a:t>
             </a:r>
           </a:p>
           <a:p>
@@ -15355,7 +15363,15 @@
             </a:r>
             <a:r>
               <a:rPr lang="en-US" sz="2400" dirty="0"/>
-              <a:t>affect the rate of the tutor. </a:t>
+              <a:t>affect the </a:t>
+            </a:r>
+            <a:r>
+              <a:rPr lang="en-US" sz="2400" dirty="0" smtClean="0"/>
+              <a:t>rating </a:t>
+            </a:r>
+            <a:r>
+              <a:rPr lang="en-US" sz="2400" dirty="0"/>
+              <a:t>of the tutor. </a:t>
             </a:r>
             <a:endParaRPr lang="en-US" sz="2400" dirty="0" smtClean="0"/>
           </a:p>
@@ -15365,19 +15381,70 @@
           <a:p>
             <a:r>
               <a:rPr lang="en-US" sz="2400" dirty="0" smtClean="0"/>
-              <a:t>Students will be able to search for tutors close to their location </a:t>
+              <a:t>Students will be able to search for tutors </a:t>
             </a:r>
-          </a:p>
-          <a:p>
-            <a:endParaRPr lang="en-US" sz="2400" dirty="0"/>
-          </a:p>
-          <a:p>
             <a:r>
               <a:rPr lang="en-US" sz="2400" dirty="0" smtClean="0"/>
-              <a:t>Question will be associate with a category when entered by the students. Allowing future user to look questions/answers from an specific category.</a:t>
+              <a:t>who live near their location</a:t>
             </a:r>
-          </a:p>
-          <a:p>
+            <a:r>
+              <a:rPr lang="en-US" sz="2400" dirty="0" smtClean="0"/>
+              <a:t>.</a:t>
+            </a:r>
+            <a:endParaRPr lang="en-US" sz="2400" dirty="0" smtClean="0"/>
+          </a:p>
+          <a:p>
+            <a:endParaRPr lang="en-US" sz="2400" dirty="0"/>
+          </a:p>
+          <a:p>
+            <a:r>
+              <a:rPr lang="en-US" sz="2400" dirty="0" smtClean="0"/>
+              <a:t>Q</a:t>
+            </a:r>
+            <a:r>
+              <a:rPr lang="en-US" sz="2400" dirty="0" smtClean="0"/>
+              <a:t>uestions </a:t>
+            </a:r>
+            <a:r>
+              <a:rPr lang="en-US" sz="2400" dirty="0" smtClean="0"/>
+              <a:t>will be </a:t>
+            </a:r>
+            <a:r>
+              <a:rPr lang="en-US" sz="2400" dirty="0" smtClean="0"/>
+              <a:t>associated </a:t>
+            </a:r>
+            <a:r>
+              <a:rPr lang="en-US" sz="2400" dirty="0" smtClean="0"/>
+              <a:t>with a category when entered by the </a:t>
+            </a:r>
+            <a:r>
+              <a:rPr lang="en-US" sz="2400" dirty="0" smtClean="0"/>
+              <a:t>students. Allowing any future users </a:t>
+            </a:r>
+            <a:r>
+              <a:rPr lang="en-US" sz="2400" dirty="0" smtClean="0"/>
+              <a:t>to look </a:t>
+            </a:r>
+            <a:r>
+              <a:rPr lang="en-US" sz="2400" dirty="0" smtClean="0"/>
+              <a:t>at the questions or answers </a:t>
+            </a:r>
+            <a:r>
+              <a:rPr lang="en-US" sz="2400" dirty="0" smtClean="0"/>
+              <a:t>from </a:t>
+            </a:r>
+            <a:r>
+              <a:rPr lang="en-US" sz="2400" dirty="0" smtClean="0"/>
+              <a:t>a </a:t>
+            </a:r>
+            <a:r>
+              <a:rPr lang="en-US" sz="2400" dirty="0" smtClean="0"/>
+              <a:t>specific category</a:t>
+            </a:r>
+            <a:r>
+              <a:rPr lang="en-US" sz="2400" dirty="0" smtClean="0"/>
+              <a:t>.</a:t>
+            </a:r>
             <a:endParaRPr lang="en-US" sz="2400" dirty="0"/>
           </a:p>
           <a:p>

</xml_diff>

<commit_message>
Added market analysis to presentation
</commit_message>
<xml_diff>
--- a/Proposal.pptx
+++ b/Proposal.pptx
@@ -5,16 +5,17 @@
     <p:sldMasterId id="2147484267" r:id="rId1"/>
   </p:sldMasterIdLst>
   <p:notesMasterIdLst>
-    <p:notesMasterId r:id="rId9"/>
+    <p:notesMasterId r:id="rId10"/>
   </p:notesMasterIdLst>
   <p:sldIdLst>
     <p:sldId id="256" r:id="rId2"/>
     <p:sldId id="257" r:id="rId3"/>
     <p:sldId id="259" r:id="rId4"/>
     <p:sldId id="260" r:id="rId5"/>
-    <p:sldId id="261" r:id="rId6"/>
-    <p:sldId id="262" r:id="rId7"/>
-    <p:sldId id="258" r:id="rId8"/>
+    <p:sldId id="263" r:id="rId6"/>
+    <p:sldId id="261" r:id="rId7"/>
+    <p:sldId id="262" r:id="rId8"/>
+    <p:sldId id="258" r:id="rId9"/>
   </p:sldIdLst>
   <p:sldSz cx="9144000" cy="6858000" type="screen4x3"/>
   <p:notesSz cx="6858000" cy="9144000"/>
@@ -198,7 +199,7 @@
           <a:p>
             <a:fld id="{165DDFF0-975E-4A92-891F-989DC9045C85}" type="datetimeFigureOut">
               <a:rPr lang="en-US" smtClean="0"/>
-              <a:t>9/10/2013</a:t>
+              <a:t>9/12/13</a:t>
             </a:fld>
             <a:endParaRPr lang="en-US"/>
           </a:p>
@@ -512,15 +513,7 @@
           <a:p>
             <a:r>
               <a:rPr lang="en-US" dirty="0" smtClean="0"/>
-              <a:t>The idea of giving a </a:t>
-            </a:r>
-            <a:r>
-              <a:rPr lang="en-US" dirty="0" smtClean="0"/>
-              <a:t>rating </a:t>
-            </a:r>
-            <a:r>
-              <a:rPr lang="en-US" dirty="0" smtClean="0"/>
-              <a:t>to tutors</a:t>
+              <a:t>The idea of giving a rating to tutors</a:t>
             </a:r>
             <a:r>
               <a:rPr lang="en-US" baseline="0" dirty="0" smtClean="0"/>
@@ -562,7 +555,7 @@
           <a:p>
             <a:fld id="{0F8DD2E9-88FF-4844-AE33-AFFDA72390CE}" type="slidenum">
               <a:rPr lang="en-US" smtClean="0"/>
-              <a:t>6</a:t>
+              <a:t>7</a:t>
             </a:fld>
             <a:endParaRPr lang="en-US"/>
           </a:p>
@@ -2120,7 +2113,7 @@
             <a:fld id="{8ACDB3CC-F982-40F9-8DD6-BCC9AFBF44BD}" type="datetime1">
               <a:rPr lang="en-US" smtClean="0"/>
               <a:pPr/>
-              <a:t>9/10/2013</a:t>
+              <a:t>9/12/13</a:t>
             </a:fld>
             <a:endParaRPr lang="en-US" dirty="0"/>
           </a:p>
@@ -3225,7 +3218,7 @@
           <a:p>
             <a:fld id="{E631EDC5-C1A1-7F47-A4AF-CDC7D9CFA916}" type="datetimeFigureOut">
               <a:rPr lang="en-US" smtClean="0"/>
-              <a:t>9/10/2013</a:t>
+              <a:t>9/12/13</a:t>
             </a:fld>
             <a:endParaRPr lang="en-US" dirty="0"/>
           </a:p>
@@ -4338,7 +4331,7 @@
           <a:p>
             <a:fld id="{E631EDC5-C1A1-7F47-A4AF-CDC7D9CFA916}" type="datetimeFigureOut">
               <a:rPr lang="en-US" smtClean="0"/>
-              <a:t>9/10/2013</a:t>
+              <a:t>9/12/13</a:t>
             </a:fld>
             <a:endParaRPr lang="en-US" dirty="0"/>
           </a:p>
@@ -5446,7 +5439,7 @@
           <a:p>
             <a:fld id="{E631EDC5-C1A1-7F47-A4AF-CDC7D9CFA916}" type="datetimeFigureOut">
               <a:rPr lang="en-US" smtClean="0"/>
-              <a:t>9/10/2013</a:t>
+              <a:t>9/12/13</a:t>
             </a:fld>
             <a:endParaRPr lang="en-US" dirty="0"/>
           </a:p>
@@ -7040,7 +7033,7 @@
             <a:fld id="{64DDAE5B-B07C-441A-8026-C23A427A74DC}" type="datetime1">
               <a:rPr lang="en-US" smtClean="0"/>
               <a:pPr/>
-              <a:t>9/10/2013</a:t>
+              <a:t>9/12/13</a:t>
             </a:fld>
             <a:endParaRPr lang="en-US" dirty="0"/>
           </a:p>
@@ -8099,7 +8092,7 @@
           <a:p>
             <a:fld id="{E631EDC5-C1A1-7F47-A4AF-CDC7D9CFA916}" type="datetimeFigureOut">
               <a:rPr lang="en-US" smtClean="0"/>
-              <a:t>9/10/2013</a:t>
+              <a:t>9/12/13</a:t>
             </a:fld>
             <a:endParaRPr lang="en-US" dirty="0"/>
           </a:p>
@@ -9426,7 +9419,7 @@
           <a:p>
             <a:fld id="{E631EDC5-C1A1-7F47-A4AF-CDC7D9CFA916}" type="datetimeFigureOut">
               <a:rPr lang="en-US" smtClean="0"/>
-              <a:t>9/10/2013</a:t>
+              <a:t>9/12/13</a:t>
             </a:fld>
             <a:endParaRPr lang="en-US" dirty="0"/>
           </a:p>
@@ -10563,7 +10556,7 @@
           <a:p>
             <a:fld id="{E631EDC5-C1A1-7F47-A4AF-CDC7D9CFA916}" type="datetimeFigureOut">
               <a:rPr lang="en-US" smtClean="0"/>
-              <a:t>9/10/2013</a:t>
+              <a:t>9/12/13</a:t>
             </a:fld>
             <a:endParaRPr lang="en-US" dirty="0"/>
           </a:p>
@@ -11619,7 +11612,7 @@
           <a:p>
             <a:fld id="{E631EDC5-C1A1-7F47-A4AF-CDC7D9CFA916}" type="datetimeFigureOut">
               <a:rPr lang="en-US" smtClean="0"/>
-              <a:t>9/10/2013</a:t>
+              <a:t>9/12/13</a:t>
             </a:fld>
             <a:endParaRPr lang="en-US" dirty="0"/>
           </a:p>
@@ -12657,7 +12650,7 @@
           <a:p>
             <a:fld id="{E631EDC5-C1A1-7F47-A4AF-CDC7D9CFA916}" type="datetimeFigureOut">
               <a:rPr lang="en-US" smtClean="0"/>
-              <a:t>9/10/2013</a:t>
+              <a:t>9/12/13</a:t>
             </a:fld>
             <a:endParaRPr lang="en-US" dirty="0"/>
           </a:p>
@@ -13893,7 +13886,7 @@
           <a:p>
             <a:fld id="{E631EDC5-C1A1-7F47-A4AF-CDC7D9CFA916}" type="datetimeFigureOut">
               <a:rPr lang="en-US" smtClean="0"/>
-              <a:t>9/10/2013</a:t>
+              <a:t>9/12/13</a:t>
             </a:fld>
             <a:endParaRPr lang="en-US" dirty="0"/>
           </a:p>
@@ -14246,7 +14239,7 @@
           <a:p>
             <a:fld id="{E631EDC5-C1A1-7F47-A4AF-CDC7D9CFA916}" type="datetimeFigureOut">
               <a:rPr lang="en-US" smtClean="0"/>
-              <a:t>9/10/2013</a:t>
+              <a:t>9/12/13</a:t>
             </a:fld>
             <a:endParaRPr lang="en-US" dirty="0"/>
           </a:p>
@@ -15089,7 +15082,11 @@
           <a:p>
             <a:r>
               <a:rPr lang="en-US" dirty="0" smtClean="0"/>
-              <a:t>Market Analysis</a:t>
+              <a:t>Market </a:t>
+            </a:r>
+            <a:r>
+              <a:rPr lang="en-US" dirty="0" smtClean="0"/>
+              <a:t>Analysis </a:t>
             </a:r>
             <a:endParaRPr lang="en-US" dirty="0"/>
           </a:p>
@@ -15110,7 +15107,64 @@
           <a:bodyPr/>
           <a:lstStyle/>
           <a:p>
-            <a:endParaRPr lang="en-US"/>
+            <a:pPr marL="342900" lvl="1"/>
+            <a:r>
+              <a:rPr lang="en-US" sz="2000" dirty="0"/>
+              <a:t>Online </a:t>
+            </a:r>
+            <a:r>
+              <a:rPr lang="en-US" sz="2000" dirty="0" smtClean="0"/>
+              <a:t>tutoring is a rapidly growing industry.</a:t>
+            </a:r>
+          </a:p>
+          <a:p>
+            <a:pPr marL="742950" lvl="2"/>
+            <a:r>
+              <a:rPr lang="en-US" dirty="0" smtClean="0"/>
+              <a:t>$</a:t>
+            </a:r>
+            <a:r>
+              <a:rPr lang="en-US" dirty="0"/>
+              <a:t>102.8 billion by 2018 (Forbes</a:t>
+            </a:r>
+            <a:r>
+              <a:rPr lang="en-US" dirty="0" smtClean="0"/>
+              <a:t>)</a:t>
+            </a:r>
+          </a:p>
+          <a:p>
+            <a:r>
+              <a:rPr lang="en-US" dirty="0" smtClean="0"/>
+              <a:t>Why?</a:t>
+            </a:r>
+          </a:p>
+          <a:p>
+            <a:pPr lvl="1"/>
+            <a:r>
+              <a:rPr lang="en-US" dirty="0" smtClean="0"/>
+              <a:t>Failure of public education </a:t>
+            </a:r>
+          </a:p>
+          <a:p>
+            <a:pPr lvl="1"/>
+            <a:r>
+              <a:rPr lang="en-US" dirty="0" smtClean="0"/>
+              <a:t>Budget cuts in U.S. public schools.</a:t>
+            </a:r>
+          </a:p>
+          <a:p>
+            <a:pPr lvl="1"/>
+            <a:r>
+              <a:rPr lang="en-US" dirty="0" smtClean="0"/>
+              <a:t>Increasing cost of higher education</a:t>
+            </a:r>
+          </a:p>
+          <a:p>
+            <a:endParaRPr lang="en-US" dirty="0" smtClean="0"/>
+          </a:p>
+          <a:p>
+            <a:pPr lvl="1"/>
+            <a:endParaRPr lang="en-US" dirty="0"/>
           </a:p>
         </p:txBody>
       </p:sp>
@@ -15164,12 +15218,14 @@
         </p:nvSpPr>
         <p:spPr/>
         <p:txBody>
-          <a:bodyPr/>
+          <a:bodyPr>
+            <a:normAutofit/>
+          </a:bodyPr>
           <a:lstStyle/>
           <a:p>
             <a:r>
               <a:rPr lang="en-US" dirty="0" smtClean="0"/>
-              <a:t>Product Features</a:t>
+              <a:t>Market Analysis</a:t>
             </a:r>
             <a:endParaRPr lang="en-US" dirty="0"/>
           </a:p>
@@ -15185,87 +15241,84 @@
             <p:ph idx="1"/>
           </p:nvPr>
         </p:nvSpPr>
-        <p:spPr>
-          <a:xfrm>
-            <a:off x="685800" y="1169043"/>
-            <a:ext cx="7772400" cy="4375230"/>
-          </a:xfrm>
-        </p:spPr>
+        <p:spPr/>
         <p:txBody>
-          <a:bodyPr>
-            <a:normAutofit/>
-          </a:bodyPr>
+          <a:bodyPr/>
           <a:lstStyle/>
           <a:p>
-            <a:endParaRPr lang="es-ES" dirty="0" smtClean="0"/>
-          </a:p>
-          <a:p>
             <a:r>
-              <a:rPr lang="en-US" sz="2400" dirty="0" smtClean="0"/>
-              <a:t>Students</a:t>
+              <a:rPr lang="en-US" dirty="0" smtClean="0"/>
+              <a:t>Top five</a:t>
             </a:r>
             <a:r>
-              <a:rPr lang="es-ES" sz="2400" dirty="0" smtClean="0"/>
-              <a:t> </a:t>
+              <a:rPr lang="en-US" dirty="0" smtClean="0"/>
+              <a:t> online tutoring companies</a:t>
             </a:r>
+          </a:p>
+          <a:p>
+            <a:pPr lvl="1"/>
             <a:r>
-              <a:rPr lang="en-US" sz="2400" dirty="0" smtClean="0"/>
-              <a:t>will be able to ask </a:t>
+              <a:rPr lang="en-US" dirty="0" err="1" smtClean="0"/>
+              <a:t>Tutor.com</a:t>
             </a:r>
-            <a:r>
-              <a:rPr lang="en-US" sz="2400" dirty="0" smtClean="0"/>
-              <a:t>questions by uploading </a:t>
-            </a:r>
-            <a:r>
-              <a:rPr lang="en-US" sz="2400" dirty="0" smtClean="0"/>
-              <a:t>a picture and a line of text specifying the question.</a:t>
-            </a:r>
-          </a:p>
-          <a:p>
-            <a:endParaRPr lang="en-US" sz="2400" dirty="0" smtClean="0"/>
-          </a:p>
-          <a:p>
-            <a:r>
-              <a:rPr lang="en-US" sz="2400" dirty="0" smtClean="0"/>
-              <a:t>Tutors or guests will answer the question through another picture or through text, depending on which is more convenient.</a:t>
-            </a:r>
-          </a:p>
-          <a:p>
-            <a:pPr lvl="2"/>
-            <a:r>
-              <a:rPr lang="en-US" sz="2000" dirty="0" smtClean="0"/>
-              <a:t>Guest: anyone who reads the question and thinks that can help</a:t>
-            </a:r>
-          </a:p>
-          <a:p>
-            <a:pPr lvl="2"/>
-            <a:r>
-              <a:rPr lang="en-US" sz="2000" dirty="0" smtClean="0"/>
-              <a:t>Tutor: registered college students or teachers.  Tutors will have contact information (location and email) and a rate.</a:t>
-            </a:r>
-          </a:p>
-          <a:p>
-            <a:pPr marL="68580" indent="0">
-              <a:buNone/>
-            </a:pPr>
+            <a:endParaRPr lang="en-US" dirty="0" smtClean="0"/>
+          </a:p>
+          <a:p>
+            <a:pPr lvl="1"/>
             <a:r>
               <a:rPr lang="en-US" dirty="0" smtClean="0"/>
-              <a:t>	</a:t>
+              <a:t>Growing stars</a:t>
             </a:r>
+          </a:p>
+          <a:p>
+            <a:pPr lvl="1"/>
+            <a:r>
+              <a:rPr lang="en-US" dirty="0" err="1" smtClean="0"/>
+              <a:t>TutorVista</a:t>
+            </a:r>
+            <a:endParaRPr lang="en-US" dirty="0" smtClean="0"/>
+          </a:p>
+          <a:p>
+            <a:pPr lvl="1"/>
+            <a:r>
+              <a:rPr lang="en-US" dirty="0" err="1" smtClean="0"/>
+              <a:t>eTutorWorld</a:t>
+            </a:r>
+            <a:endParaRPr lang="en-US" dirty="0" smtClean="0"/>
+          </a:p>
+          <a:p>
+            <a:pPr lvl="1"/>
+            <a:r>
+              <a:rPr lang="en-US" dirty="0" smtClean="0"/>
+              <a:t>Steps</a:t>
+            </a:r>
+          </a:p>
+          <a:p>
+            <a:r>
+              <a:rPr lang="en-US" dirty="0" smtClean="0"/>
+              <a:t>Pay for tutors typically $8-12 per hour.</a:t>
+            </a:r>
+          </a:p>
+          <a:p>
+            <a:r>
+              <a:rPr lang="en-US" dirty="0" smtClean="0"/>
+              <a:t>Cost for students $20-40 per hour.</a:t>
+            </a:r>
+          </a:p>
+          <a:p>
+            <a:pPr lvl="1"/>
+            <a:endParaRPr lang="en-US" dirty="0" smtClean="0"/>
+          </a:p>
+          <a:p>
+            <a:pPr lvl="1"/>
             <a:endParaRPr lang="en-US" dirty="0"/>
-          </a:p>
-          <a:p>
-            <a:endParaRPr lang="en-US" dirty="0" smtClean="0"/>
-          </a:p>
-          <a:p>
-            <a:endParaRPr lang="en-US" dirty="0" smtClean="0"/>
           </a:p>
         </p:txBody>
       </p:sp>
     </p:spTree>
     <p:extLst>
       <p:ext uri="{BB962C8B-B14F-4D97-AF65-F5344CB8AC3E}">
-        <p14:creationId xmlns:p14="http://schemas.microsoft.com/office/powerpoint/2010/main" val="760875694"/>
+        <p14:creationId xmlns:p14="http://schemas.microsoft.com/office/powerpoint/2010/main" val="2441181811"/>
       </p:ext>
     </p:extLst>
   </p:cSld>
@@ -15302,6 +15355,146 @@
       </p:grpSpPr>
       <p:sp>
         <p:nvSpPr>
+          <p:cNvPr id="3" name="Title 2"/>
+          <p:cNvSpPr>
+            <a:spLocks noGrp="1"/>
+          </p:cNvSpPr>
+          <p:nvPr>
+            <p:ph type="title"/>
+          </p:nvPr>
+        </p:nvSpPr>
+        <p:spPr/>
+        <p:txBody>
+          <a:bodyPr/>
+          <a:lstStyle/>
+          <a:p>
+            <a:r>
+              <a:rPr lang="en-US" dirty="0" smtClean="0"/>
+              <a:t>Product Features</a:t>
+            </a:r>
+            <a:endParaRPr lang="en-US" dirty="0"/>
+          </a:p>
+        </p:txBody>
+      </p:sp>
+      <p:sp>
+        <p:nvSpPr>
+          <p:cNvPr id="2" name="Content Placeholder 1"/>
+          <p:cNvSpPr>
+            <a:spLocks noGrp="1"/>
+          </p:cNvSpPr>
+          <p:nvPr>
+            <p:ph idx="1"/>
+          </p:nvPr>
+        </p:nvSpPr>
+        <p:spPr>
+          <a:xfrm>
+            <a:off x="685800" y="1169043"/>
+            <a:ext cx="7772400" cy="4375230"/>
+          </a:xfrm>
+        </p:spPr>
+        <p:txBody>
+          <a:bodyPr>
+            <a:normAutofit/>
+          </a:bodyPr>
+          <a:lstStyle/>
+          <a:p>
+            <a:endParaRPr lang="es-ES" dirty="0" smtClean="0"/>
+          </a:p>
+          <a:p>
+            <a:r>
+              <a:rPr lang="en-US" sz="2400" dirty="0" smtClean="0"/>
+              <a:t>Students</a:t>
+            </a:r>
+            <a:r>
+              <a:rPr lang="es-ES" sz="2400" dirty="0" smtClean="0"/>
+              <a:t> </a:t>
+            </a:r>
+            <a:r>
+              <a:rPr lang="en-US" sz="2400" dirty="0" smtClean="0"/>
+              <a:t>will be able to ask questions by uploading a picture and a line of text specifying the question.</a:t>
+            </a:r>
+          </a:p>
+          <a:p>
+            <a:endParaRPr lang="en-US" sz="2400" dirty="0" smtClean="0"/>
+          </a:p>
+          <a:p>
+            <a:r>
+              <a:rPr lang="en-US" sz="2400" dirty="0" smtClean="0"/>
+              <a:t>Tutors or guests will answer the question through another picture or through text, depending on which is more convenient.</a:t>
+            </a:r>
+          </a:p>
+          <a:p>
+            <a:pPr lvl="2"/>
+            <a:r>
+              <a:rPr lang="en-US" sz="2000" dirty="0" smtClean="0"/>
+              <a:t>Guest: anyone who reads the question and thinks that can help</a:t>
+            </a:r>
+          </a:p>
+          <a:p>
+            <a:pPr lvl="2"/>
+            <a:r>
+              <a:rPr lang="en-US" sz="2000" dirty="0" smtClean="0"/>
+              <a:t>Tutor: registered college students or teachers.  Tutors will have contact information (location and email) and a rate.</a:t>
+            </a:r>
+          </a:p>
+          <a:p>
+            <a:pPr marL="68580" indent="0">
+              <a:buNone/>
+            </a:pPr>
+            <a:r>
+              <a:rPr lang="en-US" dirty="0" smtClean="0"/>
+              <a:t>	</a:t>
+            </a:r>
+            <a:endParaRPr lang="en-US" dirty="0"/>
+          </a:p>
+          <a:p>
+            <a:endParaRPr lang="en-US" dirty="0" smtClean="0"/>
+          </a:p>
+          <a:p>
+            <a:endParaRPr lang="en-US" dirty="0" smtClean="0"/>
+          </a:p>
+        </p:txBody>
+      </p:sp>
+    </p:spTree>
+    <p:extLst>
+      <p:ext uri="{BB962C8B-B14F-4D97-AF65-F5344CB8AC3E}">
+        <p14:creationId xmlns:p14="http://schemas.microsoft.com/office/powerpoint/2010/main" val="760875694"/>
+      </p:ext>
+    </p:extLst>
+  </p:cSld>
+  <p:clrMapOvr>
+    <a:masterClrMapping/>
+  </p:clrMapOvr>
+  <mc:AlternateContent xmlns:mc="http://schemas.openxmlformats.org/markup-compatibility/2006" xmlns:p14="http://schemas.microsoft.com/office/powerpoint/2010/main">
+    <mc:Choice Requires="p14">
+      <p:transition spd="slow" p14:dur="2000"/>
+    </mc:Choice>
+    <mc:Fallback xmlns="">
+      <p:transition xmlns:p14="http://schemas.microsoft.com/office/powerpoint/2010/main" spd="slow"/>
+    </mc:Fallback>
+  </mc:AlternateContent>
+</p:sld>
+</file>
+
+<file path=ppt/slides/slide7.xml><?xml version="1.0" encoding="utf-8"?>
+<p:sld xmlns:a="http://schemas.openxmlformats.org/drawingml/2006/main" xmlns:r="http://schemas.openxmlformats.org/officeDocument/2006/relationships" xmlns:p="http://schemas.openxmlformats.org/presentationml/2006/main">
+  <p:cSld>
+    <p:spTree>
+      <p:nvGrpSpPr>
+        <p:cNvPr id="1" name=""/>
+        <p:cNvGrpSpPr/>
+        <p:nvPr/>
+      </p:nvGrpSpPr>
+      <p:grpSpPr>
+        <a:xfrm>
+          <a:off x="0" y="0"/>
+          <a:ext cx="0" cy="0"/>
+          <a:chOff x="0" y="0"/>
+          <a:chExt cx="0" cy="0"/>
+        </a:xfrm>
+      </p:grpSpPr>
+      <p:sp>
+        <p:nvSpPr>
           <p:cNvPr id="2" name="Title 1"/>
           <p:cNvSpPr>
             <a:spLocks noGrp="1"/>
@@ -15381,69 +15574,16 @@
           <a:p>
             <a:r>
               <a:rPr lang="en-US" sz="2400" dirty="0" smtClean="0"/>
-              <a:t>Students will be able to search for tutors </a:t>
+              <a:t>Students will be able to search for tutors who live near their location.</a:t>
             </a:r>
+          </a:p>
+          <a:p>
+            <a:endParaRPr lang="en-US" sz="2400" dirty="0"/>
+          </a:p>
+          <a:p>
             <a:r>
               <a:rPr lang="en-US" sz="2400" dirty="0" smtClean="0"/>
-              <a:t>who live near their location</a:t>
-            </a:r>
-            <a:r>
-              <a:rPr lang="en-US" sz="2400" dirty="0" smtClean="0"/>
-              <a:t>.</a:t>
-            </a:r>
-            <a:endParaRPr lang="en-US" sz="2400" dirty="0" smtClean="0"/>
-          </a:p>
-          <a:p>
-            <a:endParaRPr lang="en-US" sz="2400" dirty="0"/>
-          </a:p>
-          <a:p>
-            <a:r>
-              <a:rPr lang="en-US" sz="2400" dirty="0" smtClean="0"/>
-              <a:t>Q</a:t>
-            </a:r>
-            <a:r>
-              <a:rPr lang="en-US" sz="2400" dirty="0" smtClean="0"/>
-              <a:t>uestions </a:t>
-            </a:r>
-            <a:r>
-              <a:rPr lang="en-US" sz="2400" dirty="0" smtClean="0"/>
-              <a:t>will be </a:t>
-            </a:r>
-            <a:r>
-              <a:rPr lang="en-US" sz="2400" dirty="0" smtClean="0"/>
-              <a:t>associated </a:t>
-            </a:r>
-            <a:r>
-              <a:rPr lang="en-US" sz="2400" dirty="0" smtClean="0"/>
-              <a:t>with a category when entered by the </a:t>
-            </a:r>
-            <a:r>
-              <a:rPr lang="en-US" sz="2400" dirty="0" smtClean="0"/>
-              <a:t>students. Allowing any future users </a:t>
-            </a:r>
-            <a:r>
-              <a:rPr lang="en-US" sz="2400" dirty="0" smtClean="0"/>
-              <a:t>to look </a:t>
-            </a:r>
-            <a:r>
-              <a:rPr lang="en-US" sz="2400" dirty="0" smtClean="0"/>
-              <a:t>at the questions or answers </a:t>
-            </a:r>
-            <a:r>
-              <a:rPr lang="en-US" sz="2400" dirty="0" smtClean="0"/>
-              <a:t>from </a:t>
-            </a:r>
-            <a:r>
-              <a:rPr lang="en-US" sz="2400" dirty="0" smtClean="0"/>
-              <a:t>a </a:t>
-            </a:r>
-            <a:r>
-              <a:rPr lang="en-US" sz="2400" dirty="0" smtClean="0"/>
-              <a:t>specific category</a:t>
-            </a:r>
-            <a:r>
-              <a:rPr lang="en-US" sz="2400" dirty="0" smtClean="0"/>
-              <a:t>.</a:t>
+              <a:t>Questions will be associated with a category when entered by the students. Allowing any future users to look at the questions or answers from a specific category.</a:t>
             </a:r>
             <a:endParaRPr lang="en-US" sz="2400" dirty="0"/>
           </a:p>
@@ -15465,7 +15605,7 @@
 </p:sld>
 </file>
 
-<file path=ppt/slides/slide7.xml><?xml version="1.0" encoding="utf-8"?>
+<file path=ppt/slides/slide8.xml><?xml version="1.0" encoding="utf-8"?>
 <p:sld xmlns:a="http://schemas.openxmlformats.org/drawingml/2006/main" xmlns:r="http://schemas.openxmlformats.org/officeDocument/2006/relationships" xmlns:p="http://schemas.openxmlformats.org/presentationml/2006/main">
   <p:cSld>
     <p:spTree>

</xml_diff>

<commit_message>
Expanded market analysis area
</commit_message>
<xml_diff>
--- a/Proposal.pptx
+++ b/Proposal.pptx
@@ -15104,7 +15104,9 @@
         </p:nvSpPr>
         <p:spPr/>
         <p:txBody>
-          <a:bodyPr/>
+          <a:bodyPr>
+            <a:normAutofit/>
+          </a:bodyPr>
           <a:lstStyle/>
           <a:p>
             <a:pPr marL="342900" lvl="1"/>
@@ -15142,13 +15144,6 @@
             <a:pPr lvl="1"/>
             <a:r>
               <a:rPr lang="en-US" dirty="0" smtClean="0"/>
-              <a:t>Failure of public education </a:t>
-            </a:r>
-          </a:p>
-          <a:p>
-            <a:pPr lvl="1"/>
-            <a:r>
-              <a:rPr lang="en-US" dirty="0" smtClean="0"/>
               <a:t>Budget cuts in U.S. public schools.</a:t>
             </a:r>
           </a:p>
@@ -15158,6 +15153,82 @@
               <a:rPr lang="en-US" dirty="0" smtClean="0"/>
               <a:t>Increasing cost of higher education</a:t>
             </a:r>
+          </a:p>
+          <a:p>
+            <a:r>
+              <a:rPr lang="en-US" dirty="0"/>
+              <a:t>Top five online tutoring companies</a:t>
+            </a:r>
+          </a:p>
+          <a:p>
+            <a:pPr lvl="1"/>
+            <a:r>
+              <a:rPr lang="en-US" dirty="0" err="1" smtClean="0"/>
+              <a:t>Tutor.com</a:t>
+            </a:r>
+            <a:r>
+              <a:rPr lang="en-US" dirty="0" smtClean="0"/>
+              <a:t>, Growing stars, </a:t>
+            </a:r>
+            <a:r>
+              <a:rPr lang="en-US" dirty="0" err="1" smtClean="0"/>
+              <a:t>TutorVista</a:t>
+            </a:r>
+            <a:r>
+              <a:rPr lang="en-US" dirty="0" smtClean="0"/>
+              <a:t>, </a:t>
+            </a:r>
+            <a:r>
+              <a:rPr lang="en-US" dirty="0" err="1" smtClean="0"/>
+              <a:t>eTutorWorld</a:t>
+            </a:r>
+            <a:r>
+              <a:rPr lang="en-US" dirty="0" smtClean="0"/>
+              <a:t>, Steps</a:t>
+            </a:r>
+            <a:endParaRPr lang="en-US" dirty="0"/>
+          </a:p>
+          <a:p>
+            <a:r>
+              <a:rPr lang="en-US" dirty="0" smtClean="0"/>
+              <a:t>Typical pay $</a:t>
+            </a:r>
+            <a:r>
+              <a:rPr lang="en-US" dirty="0"/>
+              <a:t>8-12 per </a:t>
+            </a:r>
+            <a:r>
+              <a:rPr lang="en-US" dirty="0" smtClean="0"/>
+              <a:t>tutoring hour</a:t>
+            </a:r>
+            <a:r>
+              <a:rPr lang="en-US" dirty="0"/>
+              <a:t>.</a:t>
+            </a:r>
+          </a:p>
+          <a:p>
+            <a:r>
+              <a:rPr lang="en-US" dirty="0" smtClean="0"/>
+              <a:t>Typical cost $</a:t>
+            </a:r>
+            <a:r>
+              <a:rPr lang="en-US" dirty="0"/>
+              <a:t>20-40 per </a:t>
+            </a:r>
+            <a:r>
+              <a:rPr lang="en-US" dirty="0" smtClean="0"/>
+              <a:t>tutoring hour</a:t>
+            </a:r>
+            <a:r>
+              <a:rPr lang="en-US" dirty="0"/>
+              <a:t>.</a:t>
+            </a:r>
+          </a:p>
+          <a:p>
+            <a:endParaRPr lang="en-US" dirty="0" smtClean="0"/>
+          </a:p>
+          <a:p>
+            <a:endParaRPr lang="en-US" dirty="0" smtClean="0"/>
           </a:p>
           <a:p>
             <a:endParaRPr lang="en-US" dirty="0" smtClean="0"/>
@@ -15247,66 +15318,83 @@
           <a:lstStyle/>
           <a:p>
             <a:r>
-              <a:rPr lang="en-US" dirty="0" smtClean="0"/>
-              <a:t>Top five</a:t>
+              <a:rPr lang="en-US" dirty="0"/>
+              <a:t>Snap-2-Ask is comparable to online </a:t>
             </a:r>
             <a:r>
               <a:rPr lang="en-US" dirty="0" smtClean="0"/>
-              <a:t> online tutoring companies</a:t>
+              <a:t>tutoring industry-wise.</a:t>
             </a:r>
           </a:p>
           <a:p>
-            <a:pPr lvl="1"/>
             <a:r>
-              <a:rPr lang="en-US" dirty="0" err="1" smtClean="0"/>
-              <a:t>Tutor.com</a:t>
+              <a:rPr lang="en-US" dirty="0" smtClean="0"/>
+              <a:t>However, our approach is appealing in several ways:</a:t>
             </a:r>
-            <a:endParaRPr lang="en-US" dirty="0" smtClean="0"/>
           </a:p>
           <a:p>
             <a:pPr lvl="1"/>
             <a:r>
               <a:rPr lang="en-US" dirty="0" smtClean="0"/>
-              <a:t>Growing stars</a:t>
+              <a:t>Customers can ask questions without paying hefty per-hour fees.</a:t>
             </a:r>
-          </a:p>
-          <a:p>
-            <a:pPr lvl="1"/>
-            <a:r>
-              <a:rPr lang="en-US" dirty="0" err="1" smtClean="0"/>
-              <a:t>TutorVista</a:t>
-            </a:r>
-            <a:endParaRPr lang="en-US" dirty="0" smtClean="0"/>
-          </a:p>
-          <a:p>
-            <a:pPr lvl="1"/>
-            <a:r>
-              <a:rPr lang="en-US" dirty="0" err="1" smtClean="0"/>
-              <a:t>eTutorWorld</a:t>
-            </a:r>
-            <a:endParaRPr lang="en-US" dirty="0" smtClean="0"/>
           </a:p>
           <a:p>
             <a:pPr lvl="1"/>
             <a:r>
               <a:rPr lang="en-US" dirty="0" smtClean="0"/>
-              <a:t>Steps</a:t>
+              <a:t>Customers can get answers to particular questions.</a:t>
             </a:r>
           </a:p>
           <a:p>
+            <a:pPr lvl="1"/>
             <a:r>
               <a:rPr lang="en-US" dirty="0" smtClean="0"/>
-              <a:t>Pay for tutors typically $8-12 per hour.</a:t>
+              <a:t>Asking is easy; answers come fast.</a:t>
             </a:r>
           </a:p>
           <a:p>
             <a:r>
               <a:rPr lang="en-US" dirty="0" smtClean="0"/>
-              <a:t>Cost for students $20-40 per hour.</a:t>
+              <a:t>Snap-2-Ask charges students and compensates tutors on a per-question basis. </a:t>
             </a:r>
+            <a:r>
+              <a:rPr lang="en-US" dirty="0"/>
+              <a:t> </a:t>
+            </a:r>
+            <a:r>
+              <a:rPr lang="en-US" dirty="0" smtClean="0"/>
+              <a:t>As an example:</a:t>
+            </a:r>
           </a:p>
           <a:p>
             <a:pPr lvl="1"/>
+            <a:r>
+              <a:rPr lang="en-US" dirty="0"/>
+              <a:t>S</a:t>
+            </a:r>
+            <a:r>
+              <a:rPr lang="en-US" dirty="0" smtClean="0"/>
+              <a:t>tudents pay $1.10 for an answer from a high-rated user</a:t>
+            </a:r>
+          </a:p>
+          <a:p>
+            <a:pPr lvl="1"/>
+            <a:r>
+              <a:rPr lang="en-US" dirty="0" smtClean="0"/>
+              <a:t>User is paid $1 for his answer</a:t>
+            </a:r>
+          </a:p>
+          <a:p>
+            <a:pPr lvl="1"/>
+            <a:r>
+              <a:rPr lang="en-US" dirty="0" smtClean="0"/>
+              <a:t>Tutor can make at least $12/hour assuming 5 minutes </a:t>
+            </a:r>
+            <a:r>
+              <a:rPr lang="en-US" smtClean="0"/>
+              <a:t>per question</a:t>
+            </a:r>
             <a:endParaRPr lang="en-US" dirty="0" smtClean="0"/>
           </a:p>
           <a:p>

</xml_diff>

<commit_message>
added features version 2.0 and thank you slide
</commit_message>
<xml_diff>
--- a/Proposal.pptx
+++ b/Proposal.pptx
@@ -5,16 +5,21 @@
     <p:sldMasterId id="2147484267" r:id="rId1"/>
   </p:sldMasterIdLst>
   <p:notesMasterIdLst>
-    <p:notesMasterId r:id="rId9"/>
+    <p:notesMasterId r:id="rId14"/>
   </p:notesMasterIdLst>
   <p:sldIdLst>
     <p:sldId id="256" r:id="rId2"/>
     <p:sldId id="257" r:id="rId3"/>
     <p:sldId id="259" r:id="rId4"/>
-    <p:sldId id="260" r:id="rId5"/>
-    <p:sldId id="261" r:id="rId6"/>
-    <p:sldId id="262" r:id="rId7"/>
-    <p:sldId id="258" r:id="rId8"/>
+    <p:sldId id="264" r:id="rId5"/>
+    <p:sldId id="265" r:id="rId6"/>
+    <p:sldId id="260" r:id="rId7"/>
+    <p:sldId id="263" r:id="rId8"/>
+    <p:sldId id="261" r:id="rId9"/>
+    <p:sldId id="262" r:id="rId10"/>
+    <p:sldId id="266" r:id="rId11"/>
+    <p:sldId id="258" r:id="rId12"/>
+    <p:sldId id="267" r:id="rId13"/>
   </p:sldIdLst>
   <p:sldSz cx="9144000" cy="6858000" type="screen4x3"/>
   <p:notesSz cx="6858000" cy="9144000"/>
@@ -198,7 +203,7 @@
           <a:p>
             <a:fld id="{165DDFF0-975E-4A92-891F-989DC9045C85}" type="datetimeFigureOut">
               <a:rPr lang="en-US" smtClean="0"/>
-              <a:t>9/10/2013</a:t>
+              <a:t>9/13/2013</a:t>
             </a:fld>
             <a:endParaRPr lang="en-US"/>
           </a:p>
@@ -512,19 +517,19 @@
           <a:p>
             <a:r>
               <a:rPr lang="en-US" dirty="0" smtClean="0"/>
-              <a:t>The idea of giving a </a:t>
-            </a:r>
-            <a:r>
-              <a:rPr lang="en-US" dirty="0" smtClean="0"/>
-              <a:t>rating </a:t>
-            </a:r>
-            <a:r>
-              <a:rPr lang="en-US" dirty="0" smtClean="0"/>
-              <a:t>to tutors</a:t>
+              <a:t>The idea of giving a rating to tutors</a:t>
             </a:r>
             <a:r>
               <a:rPr lang="en-US" baseline="0" dirty="0" smtClean="0"/>
-              <a:t> is to provide the students with an idea of how much reliable an answer is.</a:t>
+              <a:t> is to provide the students with an idea of how </a:t>
+            </a:r>
+            <a:r>
+              <a:rPr lang="en-US" baseline="0" dirty="0" smtClean="0"/>
+              <a:t>reliable </a:t>
+            </a:r>
+            <a:r>
+              <a:rPr lang="en-US" baseline="0" dirty="0" smtClean="0"/>
+              <a:t>an answer is.</a:t>
             </a:r>
           </a:p>
           <a:p>
@@ -533,7 +538,15 @@
           <a:p>
             <a:r>
               <a:rPr lang="en-US" baseline="0" dirty="0" smtClean="0"/>
-              <a:t>Tutor will provide location information, so if a students keep getting good answers form the same tutor, and thinks it will be a good idea to get a tutor appointment, the student can go look if the tutor lives close and sent him and email. </a:t>
+              <a:t>Tutor will provide location information, so if a students keep getting good answers </a:t>
+            </a:r>
+            <a:r>
+              <a:rPr lang="en-US" baseline="0" dirty="0" smtClean="0"/>
+              <a:t>from </a:t>
+            </a:r>
+            <a:r>
+              <a:rPr lang="en-US" baseline="0" dirty="0" smtClean="0"/>
+              <a:t>the same tutor, and thinks it will be a good idea to get a tutor appointment, the student can go look if the tutor lives close and sent him and email. </a:t>
             </a:r>
           </a:p>
           <a:p>
@@ -562,7 +575,7 @@
           <a:p>
             <a:fld id="{0F8DD2E9-88FF-4844-AE33-AFFDA72390CE}" type="slidenum">
               <a:rPr lang="en-US" smtClean="0"/>
-              <a:t>6</a:t>
+              <a:t>9</a:t>
             </a:fld>
             <a:endParaRPr lang="en-US"/>
           </a:p>
@@ -2120,7 +2133,7 @@
             <a:fld id="{8ACDB3CC-F982-40F9-8DD6-BCC9AFBF44BD}" type="datetime1">
               <a:rPr lang="en-US" smtClean="0"/>
               <a:pPr/>
-              <a:t>9/10/2013</a:t>
+              <a:t>9/13/2013</a:t>
             </a:fld>
             <a:endParaRPr lang="en-US" dirty="0"/>
           </a:p>
@@ -3225,7 +3238,7 @@
           <a:p>
             <a:fld id="{E631EDC5-C1A1-7F47-A4AF-CDC7D9CFA916}" type="datetimeFigureOut">
               <a:rPr lang="en-US" smtClean="0"/>
-              <a:t>9/10/2013</a:t>
+              <a:t>9/13/2013</a:t>
             </a:fld>
             <a:endParaRPr lang="en-US" dirty="0"/>
           </a:p>
@@ -4338,7 +4351,7 @@
           <a:p>
             <a:fld id="{E631EDC5-C1A1-7F47-A4AF-CDC7D9CFA916}" type="datetimeFigureOut">
               <a:rPr lang="en-US" smtClean="0"/>
-              <a:t>9/10/2013</a:t>
+              <a:t>9/13/2013</a:t>
             </a:fld>
             <a:endParaRPr lang="en-US" dirty="0"/>
           </a:p>
@@ -5446,7 +5459,7 @@
           <a:p>
             <a:fld id="{E631EDC5-C1A1-7F47-A4AF-CDC7D9CFA916}" type="datetimeFigureOut">
               <a:rPr lang="en-US" smtClean="0"/>
-              <a:t>9/10/2013</a:t>
+              <a:t>9/13/2013</a:t>
             </a:fld>
             <a:endParaRPr lang="en-US" dirty="0"/>
           </a:p>
@@ -7040,7 +7053,7 @@
             <a:fld id="{64DDAE5B-B07C-441A-8026-C23A427A74DC}" type="datetime1">
               <a:rPr lang="en-US" smtClean="0"/>
               <a:pPr/>
-              <a:t>9/10/2013</a:t>
+              <a:t>9/13/2013</a:t>
             </a:fld>
             <a:endParaRPr lang="en-US" dirty="0"/>
           </a:p>
@@ -8099,7 +8112,7 @@
           <a:p>
             <a:fld id="{E631EDC5-C1A1-7F47-A4AF-CDC7D9CFA916}" type="datetimeFigureOut">
               <a:rPr lang="en-US" smtClean="0"/>
-              <a:t>9/10/2013</a:t>
+              <a:t>9/13/2013</a:t>
             </a:fld>
             <a:endParaRPr lang="en-US" dirty="0"/>
           </a:p>
@@ -9426,7 +9439,7 @@
           <a:p>
             <a:fld id="{E631EDC5-C1A1-7F47-A4AF-CDC7D9CFA916}" type="datetimeFigureOut">
               <a:rPr lang="en-US" smtClean="0"/>
-              <a:t>9/10/2013</a:t>
+              <a:t>9/13/2013</a:t>
             </a:fld>
             <a:endParaRPr lang="en-US" dirty="0"/>
           </a:p>
@@ -10563,7 +10576,7 @@
           <a:p>
             <a:fld id="{E631EDC5-C1A1-7F47-A4AF-CDC7D9CFA916}" type="datetimeFigureOut">
               <a:rPr lang="en-US" smtClean="0"/>
-              <a:t>9/10/2013</a:t>
+              <a:t>9/13/2013</a:t>
             </a:fld>
             <a:endParaRPr lang="en-US" dirty="0"/>
           </a:p>
@@ -11619,7 +11632,7 @@
           <a:p>
             <a:fld id="{E631EDC5-C1A1-7F47-A4AF-CDC7D9CFA916}" type="datetimeFigureOut">
               <a:rPr lang="en-US" smtClean="0"/>
-              <a:t>9/10/2013</a:t>
+              <a:t>9/13/2013</a:t>
             </a:fld>
             <a:endParaRPr lang="en-US" dirty="0"/>
           </a:p>
@@ -12657,7 +12670,7 @@
           <a:p>
             <a:fld id="{E631EDC5-C1A1-7F47-A4AF-CDC7D9CFA916}" type="datetimeFigureOut">
               <a:rPr lang="en-US" smtClean="0"/>
-              <a:t>9/10/2013</a:t>
+              <a:t>9/13/2013</a:t>
             </a:fld>
             <a:endParaRPr lang="en-US" dirty="0"/>
           </a:p>
@@ -13893,7 +13906,7 @@
           <a:p>
             <a:fld id="{E631EDC5-C1A1-7F47-A4AF-CDC7D9CFA916}" type="datetimeFigureOut">
               <a:rPr lang="en-US" smtClean="0"/>
-              <a:t>9/10/2013</a:t>
+              <a:t>9/13/2013</a:t>
             </a:fld>
             <a:endParaRPr lang="en-US" dirty="0"/>
           </a:p>
@@ -14246,7 +14259,7 @@
           <a:p>
             <a:fld id="{E631EDC5-C1A1-7F47-A4AF-CDC7D9CFA916}" type="datetimeFigureOut">
               <a:rPr lang="en-US" smtClean="0"/>
-              <a:t>9/10/2013</a:t>
+              <a:t>9/13/2013</a:t>
             </a:fld>
             <a:endParaRPr lang="en-US" dirty="0"/>
           </a:p>
@@ -14805,6 +14818,348 @@
 </p:sld>
 </file>
 
+<file path=ppt/slides/slide10.xml><?xml version="1.0" encoding="utf-8"?>
+<p:sld xmlns:a="http://schemas.openxmlformats.org/drawingml/2006/main" xmlns:r="http://schemas.openxmlformats.org/officeDocument/2006/relationships" xmlns:p="http://schemas.openxmlformats.org/presentationml/2006/main">
+  <p:cSld>
+    <p:spTree>
+      <p:nvGrpSpPr>
+        <p:cNvPr id="1" name=""/>
+        <p:cNvGrpSpPr/>
+        <p:nvPr/>
+      </p:nvGrpSpPr>
+      <p:grpSpPr>
+        <a:xfrm>
+          <a:off x="0" y="0"/>
+          <a:ext cx="0" cy="0"/>
+          <a:chOff x="0" y="0"/>
+          <a:chExt cx="0" cy="0"/>
+        </a:xfrm>
+      </p:grpSpPr>
+      <p:sp>
+        <p:nvSpPr>
+          <p:cNvPr id="2" name="Title 1"/>
+          <p:cNvSpPr>
+            <a:spLocks noGrp="1"/>
+          </p:cNvSpPr>
+          <p:nvPr>
+            <p:ph type="title"/>
+          </p:nvPr>
+        </p:nvSpPr>
+        <p:spPr/>
+        <p:txBody>
+          <a:bodyPr/>
+          <a:lstStyle/>
+          <a:p>
+            <a:r>
+              <a:rPr lang="en-US" dirty="0" smtClean="0"/>
+              <a:t>Product features   version 2.0	</a:t>
+            </a:r>
+            <a:endParaRPr lang="en-US" dirty="0"/>
+          </a:p>
+        </p:txBody>
+      </p:sp>
+      <p:sp>
+        <p:nvSpPr>
+          <p:cNvPr id="3" name="Content Placeholder 2"/>
+          <p:cNvSpPr>
+            <a:spLocks noGrp="1"/>
+          </p:cNvSpPr>
+          <p:nvPr>
+            <p:ph idx="1"/>
+          </p:nvPr>
+        </p:nvSpPr>
+        <p:spPr/>
+        <p:txBody>
+          <a:bodyPr>
+            <a:normAutofit lnSpcReduction="10000"/>
+          </a:bodyPr>
+          <a:lstStyle/>
+          <a:p>
+            <a:r>
+              <a:rPr lang="en-US" sz="2400" dirty="0" smtClean="0"/>
+              <a:t>If a student forget his/her password he/she will receive a new password to his/her email address</a:t>
+            </a:r>
+          </a:p>
+          <a:p>
+            <a:endParaRPr lang="en-US" sz="2400" dirty="0" smtClean="0"/>
+          </a:p>
+          <a:p>
+            <a:r>
+              <a:rPr lang="en-US" sz="2400" dirty="0" smtClean="0"/>
+              <a:t>Students will have to pay for each question answered, in this version we will implement the credit/debit card payment method.</a:t>
+            </a:r>
+          </a:p>
+          <a:p>
+            <a:endParaRPr lang="en-US" sz="2400" dirty="0" smtClean="0"/>
+          </a:p>
+          <a:p>
+            <a:r>
+              <a:rPr lang="en-US" sz="2400" dirty="0" smtClean="0"/>
+              <a:t>Students will be able to use the page to upload and keep their notes organized</a:t>
+            </a:r>
+            <a:endParaRPr lang="en-US" sz="2400" dirty="0"/>
+          </a:p>
+        </p:txBody>
+      </p:sp>
+    </p:spTree>
+    <p:extLst>
+      <p:ext uri="{BB962C8B-B14F-4D97-AF65-F5344CB8AC3E}">
+        <p14:creationId xmlns:p14="http://schemas.microsoft.com/office/powerpoint/2010/main" val="1401924867"/>
+      </p:ext>
+    </p:extLst>
+  </p:cSld>
+  <p:clrMapOvr>
+    <a:masterClrMapping/>
+  </p:clrMapOvr>
+</p:sld>
+</file>
+
+<file path=ppt/slides/slide11.xml><?xml version="1.0" encoding="utf-8"?>
+<p:sld xmlns:a="http://schemas.openxmlformats.org/drawingml/2006/main" xmlns:r="http://schemas.openxmlformats.org/officeDocument/2006/relationships" xmlns:p="http://schemas.openxmlformats.org/presentationml/2006/main">
+  <p:cSld>
+    <p:spTree>
+      <p:nvGrpSpPr>
+        <p:cNvPr id="1" name=""/>
+        <p:cNvGrpSpPr/>
+        <p:nvPr/>
+      </p:nvGrpSpPr>
+      <p:grpSpPr>
+        <a:xfrm>
+          <a:off x="0" y="0"/>
+          <a:ext cx="0" cy="0"/>
+          <a:chOff x="0" y="0"/>
+          <a:chExt cx="0" cy="0"/>
+        </a:xfrm>
+      </p:grpSpPr>
+      <p:sp>
+        <p:nvSpPr>
+          <p:cNvPr id="3" name="Title 2"/>
+          <p:cNvSpPr>
+            <a:spLocks noGrp="1"/>
+          </p:cNvSpPr>
+          <p:nvPr>
+            <p:ph type="title"/>
+          </p:nvPr>
+        </p:nvSpPr>
+        <p:spPr/>
+        <p:txBody>
+          <a:bodyPr>
+            <a:noAutofit/>
+          </a:bodyPr>
+          <a:lstStyle/>
+          <a:p>
+            <a:r>
+              <a:rPr lang="en-US" sz="4800" dirty="0" smtClean="0"/>
+              <a:t>Intended User Groups</a:t>
+            </a:r>
+            <a:endParaRPr lang="en-US" sz="4800" dirty="0"/>
+          </a:p>
+        </p:txBody>
+      </p:sp>
+      <p:sp>
+        <p:nvSpPr>
+          <p:cNvPr id="2" name="Content Placeholder 1"/>
+          <p:cNvSpPr>
+            <a:spLocks noGrp="1"/>
+          </p:cNvSpPr>
+          <p:nvPr>
+            <p:ph idx="1"/>
+          </p:nvPr>
+        </p:nvSpPr>
+        <p:spPr>
+          <a:xfrm>
+            <a:off x="685800" y="1814089"/>
+            <a:ext cx="7772400" cy="3733800"/>
+          </a:xfrm>
+        </p:spPr>
+        <p:txBody>
+          <a:bodyPr>
+            <a:noAutofit/>
+          </a:bodyPr>
+          <a:lstStyle/>
+          <a:p>
+            <a:pPr lvl="0"/>
+            <a:r>
+              <a:rPr lang="en-US" sz="2400" dirty="0" smtClean="0"/>
+              <a:t>High School Students</a:t>
+            </a:r>
+          </a:p>
+          <a:p>
+            <a:pPr lvl="1"/>
+            <a:r>
+              <a:rPr lang="en-US" sz="2000" dirty="0" smtClean="0"/>
+              <a:t>Ask Questions</a:t>
+            </a:r>
+          </a:p>
+          <a:p>
+            <a:pPr lvl="0"/>
+            <a:endParaRPr lang="en-US" sz="2400" dirty="0" smtClean="0"/>
+          </a:p>
+          <a:p>
+            <a:pPr lvl="0"/>
+            <a:r>
+              <a:rPr lang="en-US" sz="2400" dirty="0" smtClean="0"/>
+              <a:t>College Students</a:t>
+            </a:r>
+          </a:p>
+          <a:p>
+            <a:pPr lvl="1"/>
+            <a:r>
+              <a:rPr lang="en-US" sz="2000" dirty="0" smtClean="0"/>
+              <a:t>Reply With Answers</a:t>
+            </a:r>
+          </a:p>
+          <a:p>
+            <a:pPr lvl="0"/>
+            <a:endParaRPr lang="en-US" sz="2400" dirty="0" smtClean="0"/>
+          </a:p>
+          <a:p>
+            <a:pPr lvl="0"/>
+            <a:r>
+              <a:rPr lang="en-US" sz="2400" dirty="0" smtClean="0"/>
+              <a:t>Teachers</a:t>
+            </a:r>
+          </a:p>
+          <a:p>
+            <a:pPr lvl="1"/>
+            <a:r>
+              <a:rPr lang="en-US" sz="2000" dirty="0" smtClean="0"/>
+              <a:t>Reply With Answers</a:t>
+            </a:r>
+            <a:endParaRPr lang="en-US" sz="2000" dirty="0"/>
+          </a:p>
+        </p:txBody>
+      </p:sp>
+    </p:spTree>
+    <p:extLst>
+      <p:ext uri="{BB962C8B-B14F-4D97-AF65-F5344CB8AC3E}">
+        <p14:creationId xmlns:p14="http://schemas.microsoft.com/office/powerpoint/2010/main" val="881091896"/>
+      </p:ext>
+    </p:extLst>
+  </p:cSld>
+  <p:clrMapOvr>
+    <a:masterClrMapping/>
+  </p:clrMapOvr>
+  <mc:AlternateContent xmlns:mc="http://schemas.openxmlformats.org/markup-compatibility/2006" xmlns:p14="http://schemas.microsoft.com/office/powerpoint/2010/main">
+    <mc:Choice Requires="p14">
+      <p:transition spd="slow" p14:dur="2000"/>
+    </mc:Choice>
+    <mc:Fallback xmlns="">
+      <p:transition xmlns:p14="http://schemas.microsoft.com/office/powerpoint/2010/main" spd="slow"/>
+    </mc:Fallback>
+  </mc:AlternateContent>
+</p:sld>
+</file>
+
+<file path=ppt/slides/slide12.xml><?xml version="1.0" encoding="utf-8"?>
+<p:sld xmlns:a="http://schemas.openxmlformats.org/drawingml/2006/main" xmlns:r="http://schemas.openxmlformats.org/officeDocument/2006/relationships" xmlns:p="http://schemas.openxmlformats.org/presentationml/2006/main">
+  <p:cSld>
+    <p:spTree>
+      <p:nvGrpSpPr>
+        <p:cNvPr id="1" name=""/>
+        <p:cNvGrpSpPr/>
+        <p:nvPr/>
+      </p:nvGrpSpPr>
+      <p:grpSpPr>
+        <a:xfrm>
+          <a:off x="0" y="0"/>
+          <a:ext cx="0" cy="0"/>
+          <a:chOff x="0" y="0"/>
+          <a:chExt cx="0" cy="0"/>
+        </a:xfrm>
+      </p:grpSpPr>
+      <p:sp>
+        <p:nvSpPr>
+          <p:cNvPr id="2" name="Title 1"/>
+          <p:cNvSpPr>
+            <a:spLocks noGrp="1"/>
+          </p:cNvSpPr>
+          <p:nvPr>
+            <p:ph type="title"/>
+          </p:nvPr>
+        </p:nvSpPr>
+        <p:spPr>
+          <a:xfrm>
+            <a:off x="685800" y="846138"/>
+            <a:ext cx="7772400" cy="1143000"/>
+          </a:xfrm>
+        </p:spPr>
+        <p:txBody>
+          <a:bodyPr>
+            <a:normAutofit/>
+          </a:bodyPr>
+          <a:lstStyle/>
+          <a:p>
+            <a:r>
+              <a:rPr lang="en-US" sz="6000" dirty="0" smtClean="0"/>
+              <a:t>Thank you!</a:t>
+            </a:r>
+            <a:endParaRPr lang="en-US" sz="6000" dirty="0"/>
+          </a:p>
+        </p:txBody>
+      </p:sp>
+      <p:sp>
+        <p:nvSpPr>
+          <p:cNvPr id="3" name="Content Placeholder 2"/>
+          <p:cNvSpPr>
+            <a:spLocks noGrp="1"/>
+          </p:cNvSpPr>
+          <p:nvPr>
+            <p:ph idx="1"/>
+          </p:nvPr>
+        </p:nvSpPr>
+        <p:spPr/>
+        <p:txBody>
+          <a:bodyPr>
+            <a:normAutofit/>
+          </a:bodyPr>
+          <a:lstStyle/>
+          <a:p>
+            <a:pPr lvl="3"/>
+            <a:endParaRPr lang="en-US" sz="4000" dirty="0" smtClean="0"/>
+          </a:p>
+          <a:p>
+            <a:pPr lvl="3"/>
+            <a:endParaRPr lang="en-US" sz="4000" dirty="0"/>
+          </a:p>
+          <a:p>
+            <a:pPr marL="2240280" lvl="5" indent="0">
+              <a:buNone/>
+            </a:pPr>
+            <a:r>
+              <a:rPr lang="en-US" sz="4000" dirty="0" smtClean="0"/>
+              <a:t>	QUESTIONS/</a:t>
+            </a:r>
+          </a:p>
+          <a:p>
+            <a:pPr marL="2240280" lvl="5" indent="0">
+              <a:buNone/>
+            </a:pPr>
+            <a:r>
+              <a:rPr lang="en-US" sz="4000" dirty="0"/>
+              <a:t>	</a:t>
+            </a:r>
+            <a:r>
+              <a:rPr lang="en-US" sz="4000" dirty="0" smtClean="0"/>
+              <a:t>		COMMENTS</a:t>
+            </a:r>
+            <a:endParaRPr lang="en-US" sz="4000" dirty="0"/>
+          </a:p>
+        </p:txBody>
+      </p:sp>
+    </p:spTree>
+    <p:extLst>
+      <p:ext uri="{BB962C8B-B14F-4D97-AF65-F5344CB8AC3E}">
+        <p14:creationId xmlns:p14="http://schemas.microsoft.com/office/powerpoint/2010/main" val="882176418"/>
+      </p:ext>
+    </p:extLst>
+  </p:cSld>
+  <p:clrMapOvr>
+    <a:masterClrMapping/>
+  </p:clrMapOvr>
+</p:sld>
+</file>
+
 <file path=ppt/slides/slide2.xml><?xml version="1.0" encoding="utf-8"?>
 <p:sld xmlns:a="http://schemas.openxmlformats.org/drawingml/2006/main" xmlns:r="http://schemas.openxmlformats.org/officeDocument/2006/relationships" xmlns:p="http://schemas.openxmlformats.org/presentationml/2006/main">
   <p:cSld>
@@ -14943,7 +15298,7 @@
           <a:p>
             <a:r>
               <a:rPr lang="en-US" sz="3200" dirty="0" smtClean="0"/>
-              <a:t>TEAM NAME???</a:t>
+              <a:t>SNAP-2-ASK</a:t>
             </a:r>
             <a:endParaRPr lang="en-US" sz="3200" dirty="0"/>
           </a:p>
@@ -15020,10 +15375,73 @@
             <p:ph idx="1"/>
           </p:nvPr>
         </p:nvSpPr>
-        <p:spPr/>
+        <p:spPr>
+          <a:xfrm>
+            <a:off x="685800" y="1600201"/>
+            <a:ext cx="7772400" cy="3733800"/>
+          </a:xfrm>
+        </p:spPr>
         <p:txBody>
-          <a:bodyPr/>
+          <a:bodyPr>
+            <a:normAutofit/>
+          </a:bodyPr>
           <a:lstStyle/>
+          <a:p>
+            <a:pPr indent="-342900"/>
+            <a:r>
+              <a:rPr lang="en-US" sz="2200" dirty="0" smtClean="0"/>
+              <a:t>What?</a:t>
+            </a:r>
+          </a:p>
+          <a:p>
+            <a:pPr marL="0" indent="0">
+              <a:buNone/>
+            </a:pPr>
+            <a:r>
+              <a:rPr lang="en-US" sz="1700" dirty="0"/>
+              <a:t>	</a:t>
+            </a:r>
+            <a:r>
+              <a:rPr lang="en-US" sz="2100" dirty="0" smtClean="0"/>
+              <a:t>We will be creating a picture based, academic, question and 	answer software application. </a:t>
+            </a:r>
+          </a:p>
+          <a:p>
+            <a:pPr indent="-342900"/>
+            <a:r>
+              <a:rPr lang="en-US" sz="2200" dirty="0" smtClean="0"/>
+              <a:t>Why?</a:t>
+            </a:r>
+          </a:p>
+          <a:p>
+            <a:pPr marL="0" indent="0">
+              <a:buNone/>
+            </a:pPr>
+            <a:r>
+              <a:rPr lang="en-US" dirty="0" smtClean="0"/>
+              <a:t>	To aid in a students ability to post on a Q&amp;A forum through the 	use of photos.</a:t>
+            </a:r>
+          </a:p>
+          <a:p>
+            <a:pPr indent="-342900"/>
+            <a:r>
+              <a:rPr lang="en-US" sz="2200" dirty="0" smtClean="0"/>
+              <a:t>How?</a:t>
+            </a:r>
+          </a:p>
+          <a:p>
+            <a:pPr marL="0" indent="0">
+              <a:buNone/>
+            </a:pPr>
+            <a:r>
+              <a:rPr lang="en-US" dirty="0"/>
+              <a:t>	</a:t>
+            </a:r>
+            <a:r>
+              <a:rPr lang="en-US" dirty="0" smtClean="0"/>
+              <a:t>The use of photos to ask questions will aid the user by eliminating 	the typing of complex symbols and graphs that may accompany an 	academic question. </a:t>
+            </a:r>
+          </a:p>
           <a:p>
             <a:pPr marL="0" indent="0">
               <a:buNone/>
@@ -15072,89 +15490,7 @@
       </p:grpSpPr>
       <p:sp>
         <p:nvSpPr>
-          <p:cNvPr id="3" name="Title 2"/>
-          <p:cNvSpPr>
-            <a:spLocks noGrp="1"/>
-          </p:cNvSpPr>
-          <p:nvPr>
-            <p:ph type="title"/>
-          </p:nvPr>
-        </p:nvSpPr>
-        <p:spPr/>
-        <p:txBody>
-          <a:bodyPr>
-            <a:normAutofit/>
-          </a:bodyPr>
-          <a:lstStyle/>
-          <a:p>
-            <a:r>
-              <a:rPr lang="en-US" dirty="0" smtClean="0"/>
-              <a:t>Market Analysis</a:t>
-            </a:r>
-            <a:endParaRPr lang="en-US" dirty="0"/>
-          </a:p>
-        </p:txBody>
-      </p:sp>
-      <p:sp>
-        <p:nvSpPr>
-          <p:cNvPr id="2" name="Content Placeholder 1"/>
-          <p:cNvSpPr>
-            <a:spLocks noGrp="1"/>
-          </p:cNvSpPr>
-          <p:nvPr>
-            <p:ph idx="1"/>
-          </p:nvPr>
-        </p:nvSpPr>
-        <p:spPr/>
-        <p:txBody>
-          <a:bodyPr/>
-          <a:lstStyle/>
-          <a:p>
-            <a:endParaRPr lang="en-US"/>
-          </a:p>
-        </p:txBody>
-      </p:sp>
-    </p:spTree>
-    <p:extLst>
-      <p:ext uri="{BB962C8B-B14F-4D97-AF65-F5344CB8AC3E}">
-        <p14:creationId xmlns:p14="http://schemas.microsoft.com/office/powerpoint/2010/main" val="1477388648"/>
-      </p:ext>
-    </p:extLst>
-  </p:cSld>
-  <p:clrMapOvr>
-    <a:masterClrMapping/>
-  </p:clrMapOvr>
-  <mc:AlternateContent xmlns:mc="http://schemas.openxmlformats.org/markup-compatibility/2006" xmlns:p14="http://schemas.microsoft.com/office/powerpoint/2010/main">
-    <mc:Choice Requires="p14">
-      <p:transition spd="slow" p14:dur="2000"/>
-    </mc:Choice>
-    <mc:Fallback xmlns="">
-      <p:transition xmlns:p14="http://schemas.microsoft.com/office/powerpoint/2010/main" spd="slow"/>
-    </mc:Fallback>
-  </mc:AlternateContent>
-</p:sld>
-</file>
-
-<file path=ppt/slides/slide5.xml><?xml version="1.0" encoding="utf-8"?>
-<p:sld xmlns:a="http://schemas.openxmlformats.org/drawingml/2006/main" xmlns:r="http://schemas.openxmlformats.org/officeDocument/2006/relationships" xmlns:p="http://schemas.openxmlformats.org/presentationml/2006/main">
-  <p:cSld>
-    <p:spTree>
-      <p:nvGrpSpPr>
-        <p:cNvPr id="1" name=""/>
-        <p:cNvGrpSpPr/>
-        <p:nvPr/>
-      </p:nvGrpSpPr>
-      <p:grpSpPr>
-        <a:xfrm>
-          <a:off x="0" y="0"/>
-          <a:ext cx="0" cy="0"/>
-          <a:chOff x="0" y="0"/>
-          <a:chExt cx="0" cy="0"/>
-        </a:xfrm>
-      </p:grpSpPr>
-      <p:sp>
-        <p:nvSpPr>
-          <p:cNvPr id="3" name="Title 2"/>
+          <p:cNvPr id="2" name="Title 1"/>
           <p:cNvSpPr>
             <a:spLocks noGrp="1"/>
           </p:cNvSpPr>
@@ -15169,7 +15505,7 @@
           <a:p>
             <a:r>
               <a:rPr lang="en-US" dirty="0" smtClean="0"/>
-              <a:t>Product Features</a:t>
+              <a:t>Product idea</a:t>
             </a:r>
             <a:endParaRPr lang="en-US" dirty="0"/>
           </a:p>
@@ -15177,7 +15513,7 @@
       </p:sp>
       <p:sp>
         <p:nvSpPr>
-          <p:cNvPr id="2" name="Content Placeholder 1"/>
+          <p:cNvPr id="3" name="Content Placeholder 2"/>
           <p:cNvSpPr>
             <a:spLocks noGrp="1"/>
           </p:cNvSpPr>
@@ -15187,8 +15523,8 @@
         </p:nvSpPr>
         <p:spPr>
           <a:xfrm>
-            <a:off x="685800" y="1169043"/>
-            <a:ext cx="7772400" cy="4375230"/>
+            <a:off x="685800" y="1417638"/>
+            <a:ext cx="7772400" cy="4164037"/>
           </a:xfrm>
         </p:spPr>
         <p:txBody>
@@ -15197,93 +15533,119 @@
           </a:bodyPr>
           <a:lstStyle/>
           <a:p>
-            <a:endParaRPr lang="es-ES" dirty="0" smtClean="0"/>
-          </a:p>
-          <a:p>
-            <a:r>
-              <a:rPr lang="en-US" sz="2400" dirty="0" smtClean="0"/>
-              <a:t>Students</a:t>
-            </a:r>
-            <a:r>
-              <a:rPr lang="es-ES" sz="2400" dirty="0" smtClean="0"/>
-              <a:t> </a:t>
-            </a:r>
-            <a:r>
-              <a:rPr lang="en-US" sz="2400" dirty="0" smtClean="0"/>
-              <a:t>will be able to ask </a:t>
-            </a:r>
-            <a:r>
-              <a:rPr lang="en-US" sz="2400" dirty="0" smtClean="0"/>
-              <a:t>questions by uploading </a:t>
-            </a:r>
-            <a:r>
-              <a:rPr lang="en-US" sz="2400" dirty="0" smtClean="0"/>
-              <a:t>a picture and a line of text specifying the question.</a:t>
-            </a:r>
-          </a:p>
-          <a:p>
-            <a:endParaRPr lang="en-US" sz="2400" dirty="0" smtClean="0"/>
-          </a:p>
-          <a:p>
-            <a:r>
-              <a:rPr lang="en-US" sz="2400" dirty="0" smtClean="0"/>
-              <a:t>Tutors or guests will answer the question through another picture or through text, depending on which is more convenient.</a:t>
-            </a:r>
-          </a:p>
-          <a:p>
-            <a:pPr lvl="2"/>
+            <a:pPr indent="-342900"/>
+            <a:r>
+              <a:rPr lang="en-US" sz="2200" dirty="0" smtClean="0"/>
+              <a:t>Android Application</a:t>
+            </a:r>
+          </a:p>
+          <a:p>
+            <a:pPr lvl="2" indent="-342900"/>
+            <a:r>
+              <a:rPr lang="en-US" sz="2000" dirty="0"/>
+              <a:t>Simple and to the point. The app will open up with a camera,  </a:t>
+            </a:r>
             <a:r>
               <a:rPr lang="en-US" sz="2000" dirty="0" smtClean="0"/>
-              <a:t>Guest: anyone who reads the question and thinks that can help</a:t>
-            </a:r>
-          </a:p>
-          <a:p>
-            <a:pPr lvl="2"/>
+              <a:t>letting </a:t>
+            </a:r>
+            <a:r>
+              <a:rPr lang="en-US" sz="2000" dirty="0"/>
+              <a:t>the user quickly take a photo of the question they may </a:t>
+            </a:r>
             <a:r>
               <a:rPr lang="en-US" sz="2000" dirty="0" smtClean="0"/>
-              <a:t>Tutor: registered college students or teachers.  Tutors will have contact information (location and email) and a rate.</a:t>
-            </a:r>
-          </a:p>
-          <a:p>
-            <a:pPr marL="68580" indent="0">
-              <a:buNone/>
-            </a:pPr>
-            <a:r>
-              <a:rPr lang="en-US" dirty="0" smtClean="0"/>
-              <a:t>	</a:t>
-            </a:r>
-            <a:endParaRPr lang="en-US" dirty="0"/>
-          </a:p>
-          <a:p>
-            <a:endParaRPr lang="en-US" dirty="0" smtClean="0"/>
-          </a:p>
-          <a:p>
-            <a:endParaRPr lang="en-US" dirty="0" smtClean="0"/>
+              <a:t>need </a:t>
+            </a:r>
+            <a:r>
+              <a:rPr lang="en-US" sz="2000" dirty="0"/>
+              <a:t>help on. </a:t>
+            </a:r>
+            <a:endParaRPr lang="en-US" sz="2000" dirty="0" smtClean="0"/>
+          </a:p>
+          <a:p>
+            <a:pPr lvl="2" indent="-342900"/>
+            <a:r>
+              <a:rPr lang="en-US" sz="2000" dirty="0"/>
+              <a:t>Will be focused on posting, though also have basic abilities to </a:t>
+            </a:r>
+            <a:r>
+              <a:rPr lang="en-US" sz="2000" dirty="0" smtClean="0"/>
+              <a:t>browse and </a:t>
+            </a:r>
+            <a:r>
+              <a:rPr lang="en-US" sz="2000" dirty="0" smtClean="0"/>
+              <a:t>answer</a:t>
+            </a:r>
+            <a:endParaRPr lang="en-US" sz="2000" dirty="0" smtClean="0"/>
+          </a:p>
+          <a:p>
+            <a:pPr indent="-342900"/>
+            <a:r>
+              <a:rPr lang="en-US" sz="2200" dirty="0" smtClean="0"/>
+              <a:t>Website</a:t>
+            </a:r>
+          </a:p>
+          <a:p>
+            <a:pPr lvl="2" indent="-342900"/>
+            <a:r>
+              <a:rPr lang="en-US" sz="2000" dirty="0"/>
+              <a:t>A user efficient navigation system which allows for the </a:t>
+            </a:r>
+            <a:r>
+              <a:rPr lang="en-US" sz="2000" dirty="0" smtClean="0"/>
+              <a:t>browsing and </a:t>
+            </a:r>
+            <a:r>
+              <a:rPr lang="en-US" sz="2000" dirty="0"/>
+              <a:t>answering of questions</a:t>
+            </a:r>
+            <a:r>
+              <a:rPr lang="en-US" sz="2000" dirty="0" smtClean="0"/>
+              <a:t>.</a:t>
+            </a:r>
+            <a:endParaRPr lang="en-US" sz="2000" dirty="0"/>
+          </a:p>
+          <a:p>
+            <a:pPr lvl="2" indent="-342900"/>
+            <a:r>
+              <a:rPr lang="en-US" sz="2000" dirty="0"/>
+              <a:t>It will focus on </a:t>
+            </a:r>
+            <a:r>
+              <a:rPr lang="en-US" sz="2000" dirty="0" smtClean="0"/>
+              <a:t>asking and answering question, </a:t>
+            </a:r>
+            <a:r>
+              <a:rPr lang="en-US" sz="2000" dirty="0"/>
+              <a:t>though </a:t>
+            </a:r>
+            <a:r>
+              <a:rPr lang="en-US" sz="2000" dirty="0" smtClean="0"/>
+              <a:t>other functionality will also be implemented.</a:t>
+            </a:r>
+            <a:endParaRPr lang="en-US" sz="2000" dirty="0"/>
+          </a:p>
+          <a:p>
+            <a:pPr lvl="2" indent="-342900"/>
+            <a:endParaRPr lang="en-US" sz="2000" dirty="0" smtClean="0"/>
           </a:p>
         </p:txBody>
       </p:sp>
     </p:spTree>
     <p:extLst>
       <p:ext uri="{BB962C8B-B14F-4D97-AF65-F5344CB8AC3E}">
-        <p14:creationId xmlns:p14="http://schemas.microsoft.com/office/powerpoint/2010/main" val="760875694"/>
+        <p14:creationId xmlns:p14="http://schemas.microsoft.com/office/powerpoint/2010/main" val="3122823305"/>
       </p:ext>
     </p:extLst>
   </p:cSld>
   <p:clrMapOvr>
     <a:masterClrMapping/>
   </p:clrMapOvr>
-  <mc:AlternateContent xmlns:mc="http://schemas.openxmlformats.org/markup-compatibility/2006" xmlns:p14="http://schemas.microsoft.com/office/powerpoint/2010/main">
-    <mc:Choice Requires="p14">
-      <p:transition spd="slow" p14:dur="2000"/>
-    </mc:Choice>
-    <mc:Fallback xmlns="">
-      <p:transition xmlns:p14="http://schemas.microsoft.com/office/powerpoint/2010/main" spd="slow"/>
-    </mc:Fallback>
-  </mc:AlternateContent>
 </p:sld>
 </file>
 
-<file path=ppt/slides/slide6.xml><?xml version="1.0" encoding="utf-8"?>
+<file path=ppt/slides/slide5.xml><?xml version="1.0" encoding="utf-8"?>
 <p:sld xmlns:a="http://schemas.openxmlformats.org/drawingml/2006/main" xmlns:r="http://schemas.openxmlformats.org/officeDocument/2006/relationships" xmlns:p="http://schemas.openxmlformats.org/presentationml/2006/main">
   <p:cSld>
     <p:spTree>
@@ -15317,7 +15679,7 @@
           <a:p>
             <a:r>
               <a:rPr lang="en-US" dirty="0" smtClean="0"/>
-              <a:t>PRODUCT FEATURES (CONTINUE)</a:t>
+              <a:t>Product idea</a:t>
             </a:r>
             <a:endParaRPr lang="en-US" dirty="0"/>
           </a:p>
@@ -15333,15 +15695,52 @@
             <p:ph idx="1"/>
           </p:nvPr>
         </p:nvSpPr>
-        <p:spPr>
-          <a:xfrm>
-            <a:off x="685800" y="1252959"/>
-            <a:ext cx="7772400" cy="4221865"/>
-          </a:xfrm>
-        </p:spPr>
+        <p:spPr/>
         <p:txBody>
-          <a:bodyPr/>
+          <a:bodyPr>
+            <a:normAutofit lnSpcReduction="10000"/>
+          </a:bodyPr>
           <a:lstStyle/>
+          <a:p>
+            <a:r>
+              <a:rPr lang="en-US" sz="2200" dirty="0" smtClean="0"/>
+              <a:t>Database Concepts</a:t>
+            </a:r>
+          </a:p>
+          <a:p>
+            <a:endParaRPr lang="en-US" dirty="0" smtClean="0"/>
+          </a:p>
+          <a:p>
+            <a:pPr lvl="2"/>
+            <a:r>
+              <a:rPr lang="en-US" sz="2000" dirty="0"/>
+              <a:t>We will draw upon your skills acquired through Database </a:t>
+            </a:r>
+            <a:r>
+              <a:rPr lang="en-US" sz="2000" dirty="0" smtClean="0"/>
+              <a:t>Concepts </a:t>
+            </a:r>
+            <a:r>
+              <a:rPr lang="en-US" sz="2000" dirty="0"/>
+              <a:t>by creating and managing our database, including </a:t>
+            </a:r>
+            <a:r>
+              <a:rPr lang="en-US" sz="2000" dirty="0" smtClean="0"/>
+              <a:t>students </a:t>
+            </a:r>
+            <a:r>
+              <a:rPr lang="en-US" sz="2000" dirty="0"/>
+              <a:t>accounts, tutor </a:t>
+            </a:r>
+            <a:r>
+              <a:rPr lang="en-US" sz="2000" dirty="0" smtClean="0"/>
+              <a:t>accounts, questions </a:t>
+            </a:r>
+            <a:r>
+              <a:rPr lang="en-US" sz="2000" dirty="0"/>
+              <a:t>asked, and answers. </a:t>
+            </a:r>
+          </a:p>
           <a:p>
             <a:pPr marL="68580" indent="0">
               <a:buNone/>
@@ -15350,102 +15749,42 @@
           </a:p>
           <a:p>
             <a:r>
-              <a:rPr lang="en-US" sz="2400" dirty="0" smtClean="0"/>
-              <a:t>Students </a:t>
-            </a:r>
-            <a:r>
-              <a:rPr lang="en-US" sz="2400" dirty="0"/>
-              <a:t>will be able to rate the </a:t>
-            </a:r>
-            <a:r>
-              <a:rPr lang="en-US" sz="2400" dirty="0" smtClean="0"/>
-              <a:t>answers. This rate will </a:t>
-            </a:r>
-            <a:r>
-              <a:rPr lang="en-US" sz="2400" dirty="0"/>
-              <a:t>affect the </a:t>
-            </a:r>
-            <a:r>
-              <a:rPr lang="en-US" sz="2400" dirty="0" smtClean="0"/>
-              <a:t>rating </a:t>
-            </a:r>
-            <a:r>
-              <a:rPr lang="en-US" sz="2400" dirty="0"/>
-              <a:t>of the tutor. </a:t>
-            </a:r>
-            <a:endParaRPr lang="en-US" sz="2400" dirty="0" smtClean="0"/>
-          </a:p>
-          <a:p>
-            <a:endParaRPr lang="en-US" sz="2400" dirty="0"/>
-          </a:p>
-          <a:p>
-            <a:r>
-              <a:rPr lang="en-US" sz="2400" dirty="0" smtClean="0"/>
-              <a:t>Students will be able to search for tutors </a:t>
-            </a:r>
-            <a:r>
-              <a:rPr lang="en-US" sz="2400" dirty="0" smtClean="0"/>
-              <a:t>who live near their location</a:t>
-            </a:r>
-            <a:r>
-              <a:rPr lang="en-US" sz="2400" dirty="0" smtClean="0"/>
-              <a:t>.</a:t>
-            </a:r>
-            <a:endParaRPr lang="en-US" sz="2400" dirty="0" smtClean="0"/>
-          </a:p>
-          <a:p>
-            <a:endParaRPr lang="en-US" sz="2400" dirty="0"/>
-          </a:p>
-          <a:p>
-            <a:r>
-              <a:rPr lang="en-US" sz="2400" dirty="0" smtClean="0"/>
-              <a:t>Q</a:t>
-            </a:r>
-            <a:r>
-              <a:rPr lang="en-US" sz="2400" dirty="0" smtClean="0"/>
-              <a:t>uestions </a:t>
-            </a:r>
-            <a:r>
-              <a:rPr lang="en-US" sz="2400" dirty="0" smtClean="0"/>
-              <a:t>will be </a:t>
-            </a:r>
-            <a:r>
-              <a:rPr lang="en-US" sz="2400" dirty="0" smtClean="0"/>
-              <a:t>associated </a:t>
-            </a:r>
-            <a:r>
-              <a:rPr lang="en-US" sz="2400" dirty="0" smtClean="0"/>
-              <a:t>with a category when entered by the </a:t>
-            </a:r>
-            <a:r>
-              <a:rPr lang="en-US" sz="2400" dirty="0" smtClean="0"/>
-              <a:t>students. Allowing any future users </a:t>
-            </a:r>
-            <a:r>
-              <a:rPr lang="en-US" sz="2400" dirty="0" smtClean="0"/>
-              <a:t>to look </a:t>
-            </a:r>
-            <a:r>
-              <a:rPr lang="en-US" sz="2400" dirty="0" smtClean="0"/>
-              <a:t>at the questions or answers </a:t>
-            </a:r>
-            <a:r>
-              <a:rPr lang="en-US" sz="2400" dirty="0" smtClean="0"/>
-              <a:t>from </a:t>
-            </a:r>
-            <a:r>
-              <a:rPr lang="en-US" sz="2400" dirty="0" smtClean="0"/>
-              <a:t>a </a:t>
-            </a:r>
-            <a:r>
-              <a:rPr lang="en-US" sz="2400" dirty="0" smtClean="0"/>
-              <a:t>specific category</a:t>
-            </a:r>
-            <a:r>
-              <a:rPr lang="en-US" sz="2400" dirty="0" smtClean="0"/>
-              <a:t>.</a:t>
-            </a:r>
-            <a:endParaRPr lang="en-US" sz="2400" dirty="0"/>
+              <a:rPr lang="en-US" sz="2200" dirty="0" smtClean="0"/>
+              <a:t>GUI</a:t>
+            </a:r>
+          </a:p>
+          <a:p>
+            <a:pPr lvl="2"/>
+            <a:r>
+              <a:rPr lang="en-US" sz="2000" dirty="0"/>
+              <a:t>We will use our abilities gained from GUI Class by implementing a </a:t>
+            </a:r>
+            <a:r>
+              <a:rPr lang="en-US" sz="2000" dirty="0" smtClean="0"/>
+              <a:t>user </a:t>
+            </a:r>
+            <a:r>
+              <a:rPr lang="en-US" sz="2000" dirty="0"/>
+              <a:t>efficient website and android application that is user friendly </a:t>
+            </a:r>
+            <a:r>
+              <a:rPr lang="en-US" sz="2000" dirty="0" smtClean="0"/>
+              <a:t>and </a:t>
+            </a:r>
+            <a:r>
+              <a:rPr lang="en-US" sz="2000" dirty="0" smtClean="0"/>
+              <a:t>quick.</a:t>
+            </a:r>
+          </a:p>
+          <a:p>
+            <a:pPr marL="68580" indent="0">
+              <a:buNone/>
+            </a:pPr>
+            <a:r>
+              <a:rPr lang="en-US" dirty="0" smtClean="0"/>
+              <a:t>	</a:t>
+            </a:r>
+            <a:endParaRPr lang="en-US" dirty="0"/>
           </a:p>
           <a:p>
             <a:endParaRPr lang="en-US" dirty="0"/>
@@ -15455,13 +15794,228 @@
     </p:spTree>
     <p:extLst>
       <p:ext uri="{BB962C8B-B14F-4D97-AF65-F5344CB8AC3E}">
-        <p14:creationId xmlns:p14="http://schemas.microsoft.com/office/powerpoint/2010/main" val="457308372"/>
+        <p14:creationId xmlns:p14="http://schemas.microsoft.com/office/powerpoint/2010/main" val="1767539264"/>
       </p:ext>
     </p:extLst>
   </p:cSld>
   <p:clrMapOvr>
     <a:masterClrMapping/>
   </p:clrMapOvr>
+</p:sld>
+</file>
+
+<file path=ppt/slides/slide6.xml><?xml version="1.0" encoding="utf-8"?>
+<p:sld xmlns:a="http://schemas.openxmlformats.org/drawingml/2006/main" xmlns:r="http://schemas.openxmlformats.org/officeDocument/2006/relationships" xmlns:p="http://schemas.openxmlformats.org/presentationml/2006/main">
+  <p:cSld>
+    <p:spTree>
+      <p:nvGrpSpPr>
+        <p:cNvPr id="1" name=""/>
+        <p:cNvGrpSpPr/>
+        <p:nvPr/>
+      </p:nvGrpSpPr>
+      <p:grpSpPr>
+        <a:xfrm>
+          <a:off x="0" y="0"/>
+          <a:ext cx="0" cy="0"/>
+          <a:chOff x="0" y="0"/>
+          <a:chExt cx="0" cy="0"/>
+        </a:xfrm>
+      </p:grpSpPr>
+      <p:sp>
+        <p:nvSpPr>
+          <p:cNvPr id="3" name="Title 2"/>
+          <p:cNvSpPr>
+            <a:spLocks noGrp="1"/>
+          </p:cNvSpPr>
+          <p:nvPr>
+            <p:ph type="title"/>
+          </p:nvPr>
+        </p:nvSpPr>
+        <p:spPr/>
+        <p:txBody>
+          <a:bodyPr>
+            <a:normAutofit/>
+          </a:bodyPr>
+          <a:lstStyle/>
+          <a:p>
+            <a:r>
+              <a:rPr lang="en-US" dirty="0" smtClean="0"/>
+              <a:t>Market Analysis </a:t>
+            </a:r>
+            <a:endParaRPr lang="en-US" dirty="0"/>
+          </a:p>
+        </p:txBody>
+      </p:sp>
+      <p:sp>
+        <p:nvSpPr>
+          <p:cNvPr id="2" name="Content Placeholder 1"/>
+          <p:cNvSpPr>
+            <a:spLocks noGrp="1"/>
+          </p:cNvSpPr>
+          <p:nvPr>
+            <p:ph idx="1"/>
+          </p:nvPr>
+        </p:nvSpPr>
+        <p:spPr>
+          <a:xfrm>
+            <a:off x="685800" y="1702190"/>
+            <a:ext cx="7772400" cy="4487594"/>
+          </a:xfrm>
+        </p:spPr>
+        <p:txBody>
+          <a:bodyPr>
+            <a:normAutofit/>
+          </a:bodyPr>
+          <a:lstStyle/>
+          <a:p>
+            <a:pPr marL="342900" lvl="1"/>
+            <a:r>
+              <a:rPr lang="en-US" sz="2000" dirty="0"/>
+              <a:t>Online </a:t>
+            </a:r>
+            <a:r>
+              <a:rPr lang="en-US" sz="2000" dirty="0" smtClean="0"/>
+              <a:t>tutoring is a rapidly growing industry.</a:t>
+            </a:r>
+          </a:p>
+          <a:p>
+            <a:pPr marL="742950" lvl="2"/>
+            <a:r>
+              <a:rPr lang="en-US" sz="1800" dirty="0" smtClean="0"/>
+              <a:t>$</a:t>
+            </a:r>
+            <a:r>
+              <a:rPr lang="en-US" sz="1800" dirty="0"/>
+              <a:t>102.8 billion by 2018 (Forbes</a:t>
+            </a:r>
+            <a:r>
+              <a:rPr lang="en-US" sz="1800" dirty="0" smtClean="0"/>
+              <a:t>)</a:t>
+            </a:r>
+          </a:p>
+          <a:p>
+            <a:r>
+              <a:rPr lang="en-US" dirty="0" smtClean="0"/>
+              <a:t>Why?</a:t>
+            </a:r>
+          </a:p>
+          <a:p>
+            <a:pPr lvl="1"/>
+            <a:r>
+              <a:rPr lang="en-US" sz="1800" dirty="0" smtClean="0"/>
+              <a:t>Budget cuts in U.S. public schools.</a:t>
+            </a:r>
+          </a:p>
+          <a:p>
+            <a:pPr lvl="1"/>
+            <a:r>
+              <a:rPr lang="en-US" sz="1800" dirty="0" smtClean="0"/>
+              <a:t>Increasing cost of higher education</a:t>
+            </a:r>
+          </a:p>
+          <a:p>
+            <a:r>
+              <a:rPr lang="en-US" dirty="0"/>
+              <a:t>Top five online tutoring companies</a:t>
+            </a:r>
+          </a:p>
+          <a:p>
+            <a:pPr lvl="1"/>
+            <a:r>
+              <a:rPr lang="en-US" sz="1800" dirty="0" err="1" smtClean="0"/>
+              <a:t>Tutor.com</a:t>
+            </a:r>
+            <a:r>
+              <a:rPr lang="en-US" sz="1800" dirty="0" smtClean="0"/>
+              <a:t>, Growing stars, </a:t>
+            </a:r>
+            <a:r>
+              <a:rPr lang="en-US" sz="1800" dirty="0" err="1" smtClean="0"/>
+              <a:t>TutorVista</a:t>
+            </a:r>
+            <a:r>
+              <a:rPr lang="en-US" sz="1800" dirty="0" smtClean="0"/>
+              <a:t>, </a:t>
+            </a:r>
+            <a:r>
+              <a:rPr lang="en-US" sz="1800" dirty="0" err="1" smtClean="0"/>
+              <a:t>eTutorWorld</a:t>
+            </a:r>
+            <a:r>
+              <a:rPr lang="en-US" sz="1800" dirty="0" smtClean="0"/>
+              <a:t>, Steps</a:t>
+            </a:r>
+            <a:endParaRPr lang="en-US" sz="1800" dirty="0"/>
+          </a:p>
+          <a:p>
+            <a:r>
+              <a:rPr lang="en-US" dirty="0" smtClean="0"/>
+              <a:t>Typical pay $</a:t>
+            </a:r>
+            <a:r>
+              <a:rPr lang="en-US" dirty="0"/>
+              <a:t>8-12 per </a:t>
+            </a:r>
+            <a:r>
+              <a:rPr lang="en-US" dirty="0" smtClean="0"/>
+              <a:t>tutoring hour</a:t>
+            </a:r>
+            <a:r>
+              <a:rPr lang="en-US" dirty="0"/>
+              <a:t>.</a:t>
+            </a:r>
+          </a:p>
+          <a:p>
+            <a:r>
+              <a:rPr lang="en-US" dirty="0" smtClean="0"/>
+              <a:t>Typical cost $</a:t>
+            </a:r>
+            <a:r>
+              <a:rPr lang="en-US" dirty="0"/>
+              <a:t>20-40 per </a:t>
+            </a:r>
+            <a:r>
+              <a:rPr lang="en-US" dirty="0" smtClean="0"/>
+              <a:t>tutoring hour</a:t>
+            </a:r>
+            <a:r>
+              <a:rPr lang="en-US" dirty="0"/>
+              <a:t>.</a:t>
+            </a:r>
+          </a:p>
+          <a:p>
+            <a:endParaRPr lang="en-US" dirty="0" smtClean="0"/>
+          </a:p>
+          <a:p>
+            <a:endParaRPr lang="en-US" dirty="0" smtClean="0"/>
+          </a:p>
+          <a:p>
+            <a:endParaRPr lang="en-US" dirty="0" smtClean="0"/>
+          </a:p>
+          <a:p>
+            <a:pPr lvl="1"/>
+            <a:endParaRPr lang="en-US" dirty="0"/>
+          </a:p>
+        </p:txBody>
+      </p:sp>
+    </p:spTree>
+    <p:extLst>
+      <p:ext uri="{BB962C8B-B14F-4D97-AF65-F5344CB8AC3E}">
+        <p14:creationId xmlns:p14="http://schemas.microsoft.com/office/powerpoint/2010/main" val="1477388648"/>
+      </p:ext>
+    </p:extLst>
+  </p:cSld>
+  <p:clrMapOvr>
+    <a:masterClrMapping/>
+  </p:clrMapOvr>
+  <mc:AlternateContent xmlns:mc="http://schemas.openxmlformats.org/markup-compatibility/2006" xmlns:p14="http://schemas.microsoft.com/office/powerpoint/2010/main">
+    <mc:Choice Requires="p14">
+      <p:transition spd="slow" p14:dur="2000"/>
+    </mc:Choice>
+    <mc:Fallback xmlns="">
+      <p:transition xmlns:p14="http://schemas.microsoft.com/office/powerpoint/2010/main" spd="slow"/>
+    </mc:Fallback>
+  </mc:AlternateContent>
 </p:sld>
 </file>
 
@@ -15495,15 +16049,176 @@
         <p:spPr/>
         <p:txBody>
           <a:bodyPr>
-            <a:noAutofit/>
+            <a:normAutofit/>
           </a:bodyPr>
           <a:lstStyle/>
           <a:p>
             <a:r>
-              <a:rPr lang="en-US" sz="4800" dirty="0" smtClean="0"/>
-              <a:t>Intended User Groups</a:t>
-            </a:r>
-            <a:endParaRPr lang="en-US" sz="4800" dirty="0"/>
+              <a:rPr lang="en-US" dirty="0" smtClean="0"/>
+              <a:t>Market Analysis</a:t>
+            </a:r>
+            <a:endParaRPr lang="en-US" dirty="0"/>
+          </a:p>
+        </p:txBody>
+      </p:sp>
+      <p:sp>
+        <p:nvSpPr>
+          <p:cNvPr id="2" name="Content Placeholder 1"/>
+          <p:cNvSpPr>
+            <a:spLocks noGrp="1"/>
+          </p:cNvSpPr>
+          <p:nvPr>
+            <p:ph idx="1"/>
+          </p:nvPr>
+        </p:nvSpPr>
+        <p:spPr/>
+        <p:txBody>
+          <a:bodyPr/>
+          <a:lstStyle/>
+          <a:p>
+            <a:r>
+              <a:rPr lang="en-US" dirty="0"/>
+              <a:t>Snap-2-Ask is comparable to online </a:t>
+            </a:r>
+            <a:r>
+              <a:rPr lang="en-US" dirty="0" smtClean="0"/>
+              <a:t>tutoring industry-wise.</a:t>
+            </a:r>
+          </a:p>
+          <a:p>
+            <a:r>
+              <a:rPr lang="en-US" dirty="0" smtClean="0"/>
+              <a:t>However, our approach is appealing in several ways:</a:t>
+            </a:r>
+          </a:p>
+          <a:p>
+            <a:pPr lvl="1"/>
+            <a:r>
+              <a:rPr lang="en-US" sz="1800" dirty="0" smtClean="0"/>
+              <a:t>Customers can ask questions without paying hefty per-hour fees.</a:t>
+            </a:r>
+          </a:p>
+          <a:p>
+            <a:pPr lvl="1"/>
+            <a:r>
+              <a:rPr lang="en-US" sz="1800" dirty="0" smtClean="0"/>
+              <a:t>Customers can get answers to particular questions.</a:t>
+            </a:r>
+          </a:p>
+          <a:p>
+            <a:pPr lvl="1"/>
+            <a:r>
+              <a:rPr lang="en-US" sz="1800" dirty="0" smtClean="0"/>
+              <a:t>Asking is easy; answers come fast.</a:t>
+            </a:r>
+          </a:p>
+          <a:p>
+            <a:r>
+              <a:rPr lang="en-US" dirty="0" smtClean="0"/>
+              <a:t>Snap-2-Ask charges students and compensates tutors on a per-question basis. </a:t>
+            </a:r>
+            <a:r>
+              <a:rPr lang="en-US" dirty="0"/>
+              <a:t> </a:t>
+            </a:r>
+            <a:r>
+              <a:rPr lang="en-US" dirty="0" smtClean="0"/>
+              <a:t>As an example:</a:t>
+            </a:r>
+          </a:p>
+          <a:p>
+            <a:pPr lvl="1"/>
+            <a:r>
+              <a:rPr lang="en-US" sz="1800" dirty="0"/>
+              <a:t>S</a:t>
+            </a:r>
+            <a:r>
+              <a:rPr lang="en-US" sz="1800" dirty="0" smtClean="0"/>
+              <a:t>tudents pay $1.10 for an answer from a high-rated user</a:t>
+            </a:r>
+          </a:p>
+          <a:p>
+            <a:pPr lvl="1"/>
+            <a:r>
+              <a:rPr lang="en-US" sz="1800" dirty="0" smtClean="0"/>
+              <a:t>User is paid $1 for his answer</a:t>
+            </a:r>
+          </a:p>
+          <a:p>
+            <a:pPr lvl="1"/>
+            <a:r>
+              <a:rPr lang="en-US" sz="1800" dirty="0" smtClean="0"/>
+              <a:t>Tutor can make at least $12/hour assuming 5 minutes per question</a:t>
+            </a:r>
+          </a:p>
+          <a:p>
+            <a:pPr lvl="1"/>
+            <a:endParaRPr lang="en-US" dirty="0"/>
+          </a:p>
+        </p:txBody>
+      </p:sp>
+    </p:spTree>
+    <p:extLst>
+      <p:ext uri="{BB962C8B-B14F-4D97-AF65-F5344CB8AC3E}">
+        <p14:creationId xmlns:p14="http://schemas.microsoft.com/office/powerpoint/2010/main" val="2441181811"/>
+      </p:ext>
+    </p:extLst>
+  </p:cSld>
+  <p:clrMapOvr>
+    <a:masterClrMapping/>
+  </p:clrMapOvr>
+  <mc:AlternateContent xmlns:mc="http://schemas.openxmlformats.org/markup-compatibility/2006" xmlns:p14="http://schemas.microsoft.com/office/powerpoint/2010/main">
+    <mc:Choice Requires="p14">
+      <p:transition spd="slow" p14:dur="2000"/>
+    </mc:Choice>
+    <mc:Fallback xmlns="">
+      <p:transition xmlns:p14="http://schemas.microsoft.com/office/powerpoint/2010/main" spd="slow"/>
+    </mc:Fallback>
+  </mc:AlternateContent>
+</p:sld>
+</file>
+
+<file path=ppt/slides/slide8.xml><?xml version="1.0" encoding="utf-8"?>
+<p:sld xmlns:a="http://schemas.openxmlformats.org/drawingml/2006/main" xmlns:r="http://schemas.openxmlformats.org/officeDocument/2006/relationships" xmlns:p="http://schemas.openxmlformats.org/presentationml/2006/main">
+  <p:cSld>
+    <p:spTree>
+      <p:nvGrpSpPr>
+        <p:cNvPr id="1" name=""/>
+        <p:cNvGrpSpPr/>
+        <p:nvPr/>
+      </p:nvGrpSpPr>
+      <p:grpSpPr>
+        <a:xfrm>
+          <a:off x="0" y="0"/>
+          <a:ext cx="0" cy="0"/>
+          <a:chOff x="0" y="0"/>
+          <a:chExt cx="0" cy="0"/>
+        </a:xfrm>
+      </p:grpSpPr>
+      <p:sp>
+        <p:nvSpPr>
+          <p:cNvPr id="3" name="Title 2"/>
+          <p:cNvSpPr>
+            <a:spLocks noGrp="1"/>
+          </p:cNvSpPr>
+          <p:nvPr>
+            <p:ph type="title"/>
+          </p:nvPr>
+        </p:nvSpPr>
+        <p:spPr/>
+        <p:txBody>
+          <a:bodyPr/>
+          <a:lstStyle/>
+          <a:p>
+            <a:r>
+              <a:rPr lang="en-US" dirty="0" smtClean="0"/>
+              <a:t>Product </a:t>
+            </a:r>
+            <a:r>
+              <a:rPr lang="en-US" dirty="0" smtClean="0"/>
+              <a:t>Features   version 1.0</a:t>
+            </a:r>
+            <a:endParaRPr lang="en-US" dirty="0"/>
           </a:p>
         </p:txBody>
       </p:sp>
@@ -15519,72 +16234,107 @@
         </p:nvSpPr>
         <p:spPr>
           <a:xfrm>
-            <a:off x="685800" y="1814089"/>
-            <a:ext cx="7772400" cy="3733800"/>
+            <a:off x="685800" y="1540201"/>
+            <a:ext cx="7772400" cy="4375230"/>
           </a:xfrm>
         </p:spPr>
         <p:txBody>
           <a:bodyPr>
-            <a:noAutofit/>
+            <a:normAutofit/>
           </a:bodyPr>
           <a:lstStyle/>
           <a:p>
-            <a:pPr lvl="0"/>
+            <a:endParaRPr lang="es-ES" dirty="0" smtClean="0"/>
+          </a:p>
+          <a:p>
             <a:r>
               <a:rPr lang="en-US" sz="2400" dirty="0" smtClean="0"/>
-              <a:t>High School Students</a:t>
-            </a:r>
-          </a:p>
-          <a:p>
-            <a:pPr lvl="1"/>
+              <a:t>Students</a:t>
+            </a:r>
+            <a:r>
+              <a:rPr lang="es-ES" sz="2400" dirty="0" smtClean="0"/>
+              <a:t> </a:t>
+            </a:r>
+            <a:r>
+              <a:rPr lang="en-US" sz="2400" dirty="0" smtClean="0"/>
+              <a:t>will be able to ask questions by uploading a picture, </a:t>
+            </a:r>
+            <a:r>
+              <a:rPr lang="en-US" sz="2400" dirty="0" smtClean="0"/>
+              <a:t>an optional description of the question, </a:t>
+            </a:r>
+            <a:r>
+              <a:rPr lang="en-US" sz="2400" dirty="0" smtClean="0"/>
+              <a:t>and the category to which the question belongs.</a:t>
+            </a:r>
+          </a:p>
+          <a:p>
+            <a:endParaRPr lang="en-US" sz="2400" dirty="0" smtClean="0"/>
+          </a:p>
+          <a:p>
+            <a:r>
+              <a:rPr lang="en-US" sz="2400" dirty="0" smtClean="0"/>
+              <a:t>Tutors  will answer the question </a:t>
+            </a:r>
+            <a:r>
+              <a:rPr lang="en-US" sz="2400" dirty="0" smtClean="0"/>
+              <a:t>through text.</a:t>
+            </a:r>
+            <a:endParaRPr lang="en-US" sz="2000" dirty="0" smtClean="0"/>
+          </a:p>
+          <a:p>
+            <a:pPr lvl="2"/>
             <a:r>
               <a:rPr lang="en-US" sz="2000" dirty="0" smtClean="0"/>
-              <a:t>Ask Questions</a:t>
-            </a:r>
-          </a:p>
-          <a:p>
-            <a:pPr lvl="0"/>
-            <a:endParaRPr lang="en-US" sz="2400" dirty="0" smtClean="0"/>
-          </a:p>
-          <a:p>
-            <a:pPr lvl="0"/>
-            <a:r>
-              <a:rPr lang="en-US" sz="2400" dirty="0" smtClean="0"/>
-              <a:t>College Students</a:t>
-            </a:r>
-          </a:p>
-          <a:p>
-            <a:pPr lvl="1"/>
+              <a:t>Tutor: registered college </a:t>
+            </a:r>
             <a:r>
               <a:rPr lang="en-US" sz="2000" dirty="0" smtClean="0"/>
-              <a:t>Reply With Answers</a:t>
-            </a:r>
-          </a:p>
-          <a:p>
-            <a:pPr lvl="0"/>
-            <a:endParaRPr lang="en-US" sz="2400" dirty="0" smtClean="0"/>
-          </a:p>
-          <a:p>
-            <a:pPr lvl="0"/>
-            <a:r>
-              <a:rPr lang="en-US" sz="2400" dirty="0" smtClean="0"/>
-              <a:t>Teachers</a:t>
-            </a:r>
-          </a:p>
-          <a:p>
-            <a:pPr lvl="1"/>
+              <a:t>students (minimum GPA of 3.2) </a:t>
+            </a:r>
             <a:r>
               <a:rPr lang="en-US" sz="2000" dirty="0" smtClean="0"/>
-              <a:t>Reply With Answers</a:t>
-            </a:r>
-            <a:endParaRPr lang="en-US" sz="2000" dirty="0"/>
+              <a:t>or teachers.  Tutors will </a:t>
+            </a:r>
+            <a:r>
+              <a:rPr lang="en-US" sz="2000" dirty="0" smtClean="0"/>
+              <a:t>be associate with their </a:t>
+            </a:r>
+            <a:r>
+              <a:rPr lang="en-US" sz="2000" dirty="0" smtClean="0"/>
+              <a:t>contact information (location and email) and </a:t>
+            </a:r>
+            <a:r>
+              <a:rPr lang="en-US" sz="2000" dirty="0" smtClean="0"/>
+              <a:t>their </a:t>
+            </a:r>
+            <a:r>
+              <a:rPr lang="en-US" sz="2000" dirty="0" smtClean="0"/>
+              <a:t>rate.</a:t>
+            </a:r>
+          </a:p>
+          <a:p>
+            <a:pPr marL="68580" indent="0">
+              <a:buNone/>
+            </a:pPr>
+            <a:r>
+              <a:rPr lang="en-US" dirty="0" smtClean="0"/>
+              <a:t>	</a:t>
+            </a:r>
+            <a:endParaRPr lang="en-US" dirty="0"/>
+          </a:p>
+          <a:p>
+            <a:endParaRPr lang="en-US" dirty="0" smtClean="0"/>
+          </a:p>
+          <a:p>
+            <a:endParaRPr lang="en-US" dirty="0" smtClean="0"/>
           </a:p>
         </p:txBody>
       </p:sp>
     </p:spTree>
     <p:extLst>
       <p:ext uri="{BB962C8B-B14F-4D97-AF65-F5344CB8AC3E}">
-        <p14:creationId xmlns:p14="http://schemas.microsoft.com/office/powerpoint/2010/main" val="881091896"/>
+        <p14:creationId xmlns:p14="http://schemas.microsoft.com/office/powerpoint/2010/main" val="760875694"/>
       </p:ext>
     </p:extLst>
   </p:cSld>
@@ -15599,6 +16349,131 @@
       <p:transition xmlns:p14="http://schemas.microsoft.com/office/powerpoint/2010/main" spd="slow"/>
     </mc:Fallback>
   </mc:AlternateContent>
+</p:sld>
+</file>
+
+<file path=ppt/slides/slide9.xml><?xml version="1.0" encoding="utf-8"?>
+<p:sld xmlns:a="http://schemas.openxmlformats.org/drawingml/2006/main" xmlns:r="http://schemas.openxmlformats.org/officeDocument/2006/relationships" xmlns:p="http://schemas.openxmlformats.org/presentationml/2006/main">
+  <p:cSld>
+    <p:spTree>
+      <p:nvGrpSpPr>
+        <p:cNvPr id="1" name=""/>
+        <p:cNvGrpSpPr/>
+        <p:nvPr/>
+      </p:nvGrpSpPr>
+      <p:grpSpPr>
+        <a:xfrm>
+          <a:off x="0" y="0"/>
+          <a:ext cx="0" cy="0"/>
+          <a:chOff x="0" y="0"/>
+          <a:chExt cx="0" cy="0"/>
+        </a:xfrm>
+      </p:grpSpPr>
+      <p:sp>
+        <p:nvSpPr>
+          <p:cNvPr id="2" name="Title 1"/>
+          <p:cNvSpPr>
+            <a:spLocks noGrp="1"/>
+          </p:cNvSpPr>
+          <p:nvPr>
+            <p:ph type="title"/>
+          </p:nvPr>
+        </p:nvSpPr>
+        <p:spPr/>
+        <p:txBody>
+          <a:bodyPr/>
+          <a:lstStyle/>
+          <a:p>
+            <a:r>
+              <a:rPr lang="en-US" dirty="0" smtClean="0"/>
+              <a:t>PRODUCT FEATURES </a:t>
+            </a:r>
+            <a:r>
+              <a:rPr lang="en-US" dirty="0" smtClean="0"/>
+              <a:t> version1.0</a:t>
+            </a:r>
+            <a:endParaRPr lang="en-US" dirty="0"/>
+          </a:p>
+        </p:txBody>
+      </p:sp>
+      <p:sp>
+        <p:nvSpPr>
+          <p:cNvPr id="3" name="Content Placeholder 2"/>
+          <p:cNvSpPr>
+            <a:spLocks noGrp="1"/>
+          </p:cNvSpPr>
+          <p:nvPr>
+            <p:ph idx="1"/>
+          </p:nvPr>
+        </p:nvSpPr>
+        <p:spPr>
+          <a:xfrm>
+            <a:off x="685800" y="1252959"/>
+            <a:ext cx="7772400" cy="4221865"/>
+          </a:xfrm>
+        </p:spPr>
+        <p:txBody>
+          <a:bodyPr/>
+          <a:lstStyle/>
+          <a:p>
+            <a:pPr marL="68580" indent="0">
+              <a:buNone/>
+            </a:pPr>
+            <a:endParaRPr lang="en-US" dirty="0"/>
+          </a:p>
+          <a:p>
+            <a:r>
+              <a:rPr lang="en-US" sz="2400" dirty="0" smtClean="0"/>
+              <a:t>Students </a:t>
+            </a:r>
+            <a:r>
+              <a:rPr lang="en-US" sz="2400" dirty="0"/>
+              <a:t>will be able to rate the </a:t>
+            </a:r>
+            <a:r>
+              <a:rPr lang="en-US" sz="2400" dirty="0" smtClean="0"/>
+              <a:t>answers. </a:t>
+            </a:r>
+            <a:r>
+              <a:rPr lang="en-US" sz="2400" dirty="0" smtClean="0"/>
+              <a:t>The rating of the tutor will be calculate based on the rate of his/her answers and the total number of questions answered. </a:t>
+            </a:r>
+            <a:endParaRPr lang="en-US" sz="2400" dirty="0" smtClean="0"/>
+          </a:p>
+          <a:p>
+            <a:endParaRPr lang="en-US" sz="2400" dirty="0"/>
+          </a:p>
+          <a:p>
+            <a:r>
+              <a:rPr lang="en-US" sz="2400" dirty="0" smtClean="0"/>
+              <a:t>Students will be able to search for tutors who live near their location.</a:t>
+            </a:r>
+          </a:p>
+          <a:p>
+            <a:endParaRPr lang="en-US" sz="2400" dirty="0"/>
+          </a:p>
+          <a:p>
+            <a:r>
+              <a:rPr lang="en-US" sz="2400" dirty="0" smtClean="0"/>
+              <a:t>Students will have access to all the questions/answers they did.</a:t>
+            </a:r>
+            <a:endParaRPr lang="en-US" sz="2400" dirty="0"/>
+          </a:p>
+          <a:p>
+            <a:endParaRPr lang="en-US" dirty="0"/>
+          </a:p>
+        </p:txBody>
+      </p:sp>
+    </p:spTree>
+    <p:extLst>
+      <p:ext uri="{BB962C8B-B14F-4D97-AF65-F5344CB8AC3E}">
+        <p14:creationId xmlns:p14="http://schemas.microsoft.com/office/powerpoint/2010/main" val="457308372"/>
+      </p:ext>
+    </p:extLst>
+  </p:cSld>
+  <p:clrMapOvr>
+    <a:masterClrMapping/>
+  </p:clrMapOvr>
 </p:sld>
 </file>
 

</xml_diff>

<commit_message>
Added more concise version of the powerpoint.
</commit_message>
<xml_diff>
--- a/Proposal.pptx
+++ b/Proposal.pptx
@@ -170,7 +170,7 @@
             </a:lvl1pPr>
           </a:lstStyle>
           <a:p>
-            <a:endParaRPr lang="en-US"/>
+            <a:endParaRPr lang="en-US" dirty="0"/>
           </a:p>
         </p:txBody>
       </p:sp>
@@ -203,9 +203,9 @@
           <a:p>
             <a:fld id="{165DDFF0-975E-4A92-891F-989DC9045C85}" type="datetimeFigureOut">
               <a:rPr lang="en-US" smtClean="0"/>
-              <a:t>9/13/2013</a:t>
+              <a:t>9/14/13</a:t>
             </a:fld>
-            <a:endParaRPr lang="en-US"/>
+            <a:endParaRPr lang="en-US" dirty="0"/>
           </a:p>
         </p:txBody>
       </p:sp>
@@ -238,7 +238,7 @@
           <a:bodyPr vert="horz" lIns="91440" tIns="45720" rIns="91440" bIns="45720" rtlCol="0" anchor="ctr"/>
           <a:lstStyle/>
           <a:p>
-            <a:endParaRPr lang="en-US"/>
+            <a:endParaRPr lang="en-US" dirty="0"/>
           </a:p>
         </p:txBody>
       </p:sp>
@@ -329,7 +329,7 @@
             </a:lvl1pPr>
           </a:lstStyle>
           <a:p>
-            <a:endParaRPr lang="en-US"/>
+            <a:endParaRPr lang="en-US" dirty="0"/>
           </a:p>
         </p:txBody>
       </p:sp>
@@ -364,7 +364,7 @@
               <a:rPr lang="en-US" smtClean="0"/>
               <a:t>‹#›</a:t>
             </a:fld>
-            <a:endParaRPr lang="en-US"/>
+            <a:endParaRPr lang="en-US" dirty="0"/>
           </a:p>
         </p:txBody>
       </p:sp>
@@ -521,32 +521,16 @@
             </a:r>
             <a:r>
               <a:rPr lang="en-US" baseline="0" dirty="0" smtClean="0"/>
-              <a:t> is to provide the students with an idea of how </a:t>
-            </a:r>
+              <a:t> is to provide the students with an idea of how reliable an answer is.</a:t>
+            </a:r>
+          </a:p>
+          <a:p>
+            <a:endParaRPr lang="en-US" baseline="0" dirty="0" smtClean="0"/>
+          </a:p>
+          <a:p>
             <a:r>
               <a:rPr lang="en-US" baseline="0" dirty="0" smtClean="0"/>
-              <a:t>reliable </a:t>
-            </a:r>
-            <a:r>
-              <a:rPr lang="en-US" baseline="0" dirty="0" smtClean="0"/>
-              <a:t>an answer is.</a:t>
-            </a:r>
-          </a:p>
-          <a:p>
-            <a:endParaRPr lang="en-US" baseline="0" dirty="0" smtClean="0"/>
-          </a:p>
-          <a:p>
-            <a:r>
-              <a:rPr lang="en-US" baseline="0" dirty="0" smtClean="0"/>
-              <a:t>Tutor will provide location information, so if a students keep getting good answers </a:t>
-            </a:r>
-            <a:r>
-              <a:rPr lang="en-US" baseline="0" dirty="0" smtClean="0"/>
-              <a:t>from </a:t>
-            </a:r>
-            <a:r>
-              <a:rPr lang="en-US" baseline="0" dirty="0" smtClean="0"/>
-              <a:t>the same tutor, and thinks it will be a good idea to get a tutor appointment, the student can go look if the tutor lives close and sent him and email. </a:t>
+              <a:t>Tutor will provide location information, so if a students keep getting good answers from the same tutor, and thinks it will be a good idea to get a tutor appointment, the student can go look if the tutor lives close and sent him and email. </a:t>
             </a:r>
           </a:p>
           <a:p>
@@ -577,7 +561,7 @@
               <a:rPr lang="en-US" smtClean="0"/>
               <a:t>9</a:t>
             </a:fld>
-            <a:endParaRPr lang="en-US"/>
+            <a:endParaRPr lang="en-US" dirty="0"/>
           </a:p>
         </p:txBody>
       </p:sp>
@@ -2133,7 +2117,7 @@
             <a:fld id="{8ACDB3CC-F982-40F9-8DD6-BCC9AFBF44BD}" type="datetime1">
               <a:rPr lang="en-US" smtClean="0"/>
               <a:pPr/>
-              <a:t>9/13/2013</a:t>
+              <a:t>9/14/13</a:t>
             </a:fld>
             <a:endParaRPr lang="en-US" dirty="0"/>
           </a:p>
@@ -3238,7 +3222,7 @@
           <a:p>
             <a:fld id="{E631EDC5-C1A1-7F47-A4AF-CDC7D9CFA916}" type="datetimeFigureOut">
               <a:rPr lang="en-US" smtClean="0"/>
-              <a:t>9/13/2013</a:t>
+              <a:t>9/14/13</a:t>
             </a:fld>
             <a:endParaRPr lang="en-US" dirty="0"/>
           </a:p>
@@ -4351,7 +4335,7 @@
           <a:p>
             <a:fld id="{E631EDC5-C1A1-7F47-A4AF-CDC7D9CFA916}" type="datetimeFigureOut">
               <a:rPr lang="en-US" smtClean="0"/>
-              <a:t>9/13/2013</a:t>
+              <a:t>9/14/13</a:t>
             </a:fld>
             <a:endParaRPr lang="en-US" dirty="0"/>
           </a:p>
@@ -5459,7 +5443,7 @@
           <a:p>
             <a:fld id="{E631EDC5-C1A1-7F47-A4AF-CDC7D9CFA916}" type="datetimeFigureOut">
               <a:rPr lang="en-US" smtClean="0"/>
-              <a:t>9/13/2013</a:t>
+              <a:t>9/14/13</a:t>
             </a:fld>
             <a:endParaRPr lang="en-US" dirty="0"/>
           </a:p>
@@ -7053,7 +7037,7 @@
             <a:fld id="{64DDAE5B-B07C-441A-8026-C23A427A74DC}" type="datetime1">
               <a:rPr lang="en-US" smtClean="0"/>
               <a:pPr/>
-              <a:t>9/13/2013</a:t>
+              <a:t>9/14/13</a:t>
             </a:fld>
             <a:endParaRPr lang="en-US" dirty="0"/>
           </a:p>
@@ -8112,7 +8096,7 @@
           <a:p>
             <a:fld id="{E631EDC5-C1A1-7F47-A4AF-CDC7D9CFA916}" type="datetimeFigureOut">
               <a:rPr lang="en-US" smtClean="0"/>
-              <a:t>9/13/2013</a:t>
+              <a:t>9/14/13</a:t>
             </a:fld>
             <a:endParaRPr lang="en-US" dirty="0"/>
           </a:p>
@@ -9439,7 +9423,7 @@
           <a:p>
             <a:fld id="{E631EDC5-C1A1-7F47-A4AF-CDC7D9CFA916}" type="datetimeFigureOut">
               <a:rPr lang="en-US" smtClean="0"/>
-              <a:t>9/13/2013</a:t>
+              <a:t>9/14/13</a:t>
             </a:fld>
             <a:endParaRPr lang="en-US" dirty="0"/>
           </a:p>
@@ -10576,7 +10560,7 @@
           <a:p>
             <a:fld id="{E631EDC5-C1A1-7F47-A4AF-CDC7D9CFA916}" type="datetimeFigureOut">
               <a:rPr lang="en-US" smtClean="0"/>
-              <a:t>9/13/2013</a:t>
+              <a:t>9/14/13</a:t>
             </a:fld>
             <a:endParaRPr lang="en-US" dirty="0"/>
           </a:p>
@@ -11632,7 +11616,7 @@
           <a:p>
             <a:fld id="{E631EDC5-C1A1-7F47-A4AF-CDC7D9CFA916}" type="datetimeFigureOut">
               <a:rPr lang="en-US" smtClean="0"/>
-              <a:t>9/13/2013</a:t>
+              <a:t>9/14/13</a:t>
             </a:fld>
             <a:endParaRPr lang="en-US" dirty="0"/>
           </a:p>
@@ -12670,7 +12654,7 @@
           <a:p>
             <a:fld id="{E631EDC5-C1A1-7F47-A4AF-CDC7D9CFA916}" type="datetimeFigureOut">
               <a:rPr lang="en-US" smtClean="0"/>
-              <a:t>9/13/2013</a:t>
+              <a:t>9/14/13</a:t>
             </a:fld>
             <a:endParaRPr lang="en-US" dirty="0"/>
           </a:p>
@@ -13906,7 +13890,7 @@
           <a:p>
             <a:fld id="{E631EDC5-C1A1-7F47-A4AF-CDC7D9CFA916}" type="datetimeFigureOut">
               <a:rPr lang="en-US" smtClean="0"/>
-              <a:t>9/13/2013</a:t>
+              <a:t>9/14/13</a:t>
             </a:fld>
             <a:endParaRPr lang="en-US" dirty="0"/>
           </a:p>
@@ -14259,7 +14243,7 @@
           <a:p>
             <a:fld id="{E631EDC5-C1A1-7F47-A4AF-CDC7D9CFA916}" type="datetimeFigureOut">
               <a:rPr lang="en-US" smtClean="0"/>
-              <a:t>9/13/2013</a:t>
+              <a:t>9/14/13</a:t>
             </a:fld>
             <a:endParaRPr lang="en-US" dirty="0"/>
           </a:p>
@@ -14852,7 +14836,15 @@
           <a:p>
             <a:r>
               <a:rPr lang="en-US" dirty="0" smtClean="0"/>
-              <a:t>Product features   version 2.0	</a:t>
+              <a:t>Product </a:t>
+            </a:r>
+            <a:r>
+              <a:rPr lang="en-US" dirty="0" smtClean="0"/>
+              <a:t>features version </a:t>
+            </a:r>
+            <a:r>
+              <a:rPr lang="en-US" dirty="0" smtClean="0"/>
+              <a:t>2.0	</a:t>
             </a:r>
             <a:endParaRPr lang="en-US" dirty="0"/>
           </a:p>
@@ -14877,27 +14869,86 @@
           <a:p>
             <a:r>
               <a:rPr lang="en-US" sz="2400" dirty="0" smtClean="0"/>
-              <a:t>If a student forget his/her password he/she will receive a new password to his/her email address</a:t>
-            </a:r>
-          </a:p>
-          <a:p>
+              <a:t>If a student forget </a:t>
+            </a:r>
+            <a:r>
+              <a:rPr lang="en-US" sz="2400" dirty="0" smtClean="0"/>
+              <a:t>their password they will </a:t>
+            </a:r>
+            <a:r>
+              <a:rPr lang="en-US" sz="2400" dirty="0" smtClean="0"/>
+              <a:t>receive a new password to </a:t>
+            </a:r>
+            <a:r>
+              <a:rPr lang="en-US" sz="2400" dirty="0" smtClean="0"/>
+              <a:t>their email address.</a:t>
+            </a:r>
             <a:endParaRPr lang="en-US" sz="2400" dirty="0" smtClean="0"/>
           </a:p>
           <a:p>
             <a:r>
               <a:rPr lang="en-US" sz="2400" dirty="0" smtClean="0"/>
-              <a:t>Students will have to pay for each question answered, in this version we will implement the credit/debit card payment method.</a:t>
-            </a:r>
-          </a:p>
-          <a:p>
+              <a:t>Students will have to pay for each </a:t>
+            </a:r>
+            <a:r>
+              <a:rPr lang="en-US" sz="2400" dirty="0" smtClean="0"/>
+              <a:t>answer.</a:t>
+            </a:r>
+          </a:p>
+          <a:p>
+            <a:pPr lvl="1"/>
+            <a:r>
+              <a:rPr lang="en-US" dirty="0" smtClean="0"/>
+              <a:t>Credit/</a:t>
+            </a:r>
+            <a:r>
+              <a:rPr lang="en-US" dirty="0" smtClean="0"/>
+              <a:t>debit card payment </a:t>
+            </a:r>
+            <a:r>
+              <a:rPr lang="en-US" dirty="0" smtClean="0"/>
+              <a:t>method</a:t>
+            </a:r>
+            <a:endParaRPr lang="en-US" dirty="0"/>
+          </a:p>
+          <a:p>
+            <a:pPr lvl="1"/>
+            <a:r>
+              <a:rPr lang="en-US" dirty="0" smtClean="0"/>
+              <a:t>Student can make deposit so as not to pay every time</a:t>
+            </a:r>
+          </a:p>
+          <a:p>
+            <a:r>
+              <a:rPr lang="en-US" sz="2400" dirty="0" smtClean="0"/>
+              <a:t>Answerers will have to </a:t>
+            </a:r>
+            <a:r>
+              <a:rPr lang="en-US" sz="2400" smtClean="0"/>
+              <a:t>get validated.</a:t>
+            </a:r>
             <a:endParaRPr lang="en-US" sz="2400" dirty="0" smtClean="0"/>
           </a:p>
           <a:p>
             <a:r>
               <a:rPr lang="en-US" sz="2400" dirty="0" smtClean="0"/>
-              <a:t>Students will be able to use the page to upload and keep their notes organized</a:t>
-            </a:r>
-            <a:endParaRPr lang="en-US" sz="2400" dirty="0"/>
+              <a:t>Answerers will get paid for their answers based on their rating.</a:t>
+            </a:r>
+          </a:p>
+          <a:p>
+            <a:pPr lvl="1"/>
+            <a:r>
+              <a:rPr lang="en-US" dirty="0" smtClean="0"/>
+              <a:t>Can link their Snap-2-Ask account to their bank account</a:t>
+            </a:r>
+          </a:p>
+          <a:p>
+            <a:pPr lvl="1"/>
+            <a:r>
+              <a:rPr lang="en-US" dirty="0" smtClean="0"/>
+              <a:t>Withdraw money at any time</a:t>
+            </a:r>
+            <a:endParaRPr lang="en-US" dirty="0"/>
           </a:p>
         </p:txBody>
       </p:sp>
@@ -14981,52 +15032,63 @@
             <a:pPr lvl="0"/>
             <a:r>
               <a:rPr lang="en-US" sz="2400" dirty="0" smtClean="0"/>
-              <a:t>High School Students</a:t>
+              <a:t>Askers</a:t>
             </a:r>
           </a:p>
           <a:p>
             <a:pPr lvl="1"/>
             <a:r>
-              <a:rPr lang="en-US" sz="2000" dirty="0" smtClean="0"/>
-              <a:t>Ask Questions</a:t>
-            </a:r>
+              <a:rPr lang="en-US" dirty="0" smtClean="0"/>
+              <a:t>Middle school students</a:t>
+            </a:r>
+          </a:p>
+          <a:p>
+            <a:pPr lvl="1"/>
+            <a:r>
+              <a:rPr lang="en-US" dirty="0"/>
+              <a:t>H</a:t>
+            </a:r>
+            <a:r>
+              <a:rPr lang="en-US" dirty="0" smtClean="0"/>
+              <a:t>igh school students</a:t>
+            </a:r>
+          </a:p>
+          <a:p>
+            <a:pPr lvl="1"/>
+            <a:r>
+              <a:rPr lang="en-US" dirty="0" smtClean="0"/>
+              <a:t>College students</a:t>
+            </a:r>
+            <a:endParaRPr lang="en-US" dirty="0"/>
           </a:p>
           <a:p>
             <a:pPr lvl="0"/>
-            <a:endParaRPr lang="en-US" sz="2400" dirty="0" smtClean="0"/>
-          </a:p>
-          <a:p>
-            <a:pPr lvl="0"/>
             <a:r>
               <a:rPr lang="en-US" sz="2400" dirty="0" smtClean="0"/>
-              <a:t>College Students</a:t>
+              <a:t>Answerers</a:t>
             </a:r>
           </a:p>
           <a:p>
             <a:pPr lvl="1"/>
             <a:r>
-              <a:rPr lang="en-US" sz="2000" dirty="0" smtClean="0"/>
-              <a:t>Reply With Answers</a:t>
-            </a:r>
-          </a:p>
-          <a:p>
-            <a:pPr lvl="0"/>
-            <a:endParaRPr lang="en-US" sz="2400" dirty="0" smtClean="0"/>
-          </a:p>
-          <a:p>
-            <a:pPr lvl="0"/>
-            <a:r>
-              <a:rPr lang="en-US" sz="2400" dirty="0" smtClean="0"/>
+              <a:rPr lang="en-US" dirty="0" smtClean="0"/>
+              <a:t>College students</a:t>
+            </a:r>
+          </a:p>
+          <a:p>
+            <a:pPr lvl="1"/>
+            <a:r>
+              <a:rPr lang="en-US" dirty="0" smtClean="0"/>
               <a:t>Teachers</a:t>
             </a:r>
           </a:p>
           <a:p>
             <a:pPr lvl="1"/>
             <a:r>
-              <a:rPr lang="en-US" sz="2000" dirty="0" smtClean="0"/>
-              <a:t>Reply With Answers</a:t>
-            </a:r>
-            <a:endParaRPr lang="en-US" sz="2000" dirty="0"/>
+              <a:rPr lang="en-US" dirty="0" smtClean="0"/>
+              <a:t>Anyone who passes subject-based tests</a:t>
+            </a:r>
+            <a:endParaRPr lang="en-US" dirty="0" smtClean="0"/>
           </a:p>
         </p:txBody>
       </p:sp>
@@ -15194,7 +15256,7 @@
           <a:p>
             <a:r>
               <a:rPr lang="en-US" dirty="0" smtClean="0"/>
-              <a:t>Who Are We</a:t>
+              <a:t>Who We Are</a:t>
             </a:r>
             <a:endParaRPr lang="en-US" dirty="0"/>
           </a:p>
@@ -15224,8 +15286,25 @@
           <a:p>
             <a:r>
               <a:rPr lang="en-US" sz="2800" dirty="0" smtClean="0"/>
-              <a:t>Elena					Database</a:t>
-            </a:r>
+              <a:t>Elena </a:t>
+            </a:r>
+            <a:r>
+              <a:rPr lang="en-US" sz="2800" dirty="0" smtClean="0"/>
+              <a:t>Villamil</a:t>
+            </a:r>
+            <a:r>
+              <a:rPr lang="en-US" sz="2800" dirty="0" smtClean="0"/>
+              <a:t> Rodriguez</a:t>
+            </a:r>
+            <a:r>
+              <a:rPr lang="en-US" sz="2800" dirty="0" smtClean="0"/>
+              <a:t>		</a:t>
+            </a:r>
+            <a:r>
+              <a:rPr lang="en-US" sz="2800" dirty="0" smtClean="0"/>
+              <a:t>Database</a:t>
+            </a:r>
+            <a:endParaRPr lang="en-US" sz="2800" dirty="0" smtClean="0"/>
           </a:p>
           <a:p>
             <a:r>
@@ -15250,7 +15329,15 @@
           <a:p>
             <a:r>
               <a:rPr lang="en-US" sz="2800" dirty="0" smtClean="0"/>
-              <a:t>Roman 					</a:t>
+              <a:t>Roman </a:t>
+            </a:r>
+            <a:r>
+              <a:rPr lang="en-US" sz="2800" dirty="0" smtClean="0"/>
+              <a:t>Stolyarov</a:t>
+            </a:r>
+            <a:r>
+              <a:rPr lang="en-US" sz="2800" dirty="0" smtClean="0"/>
+              <a:t>			</a:t>
             </a:r>
             <a:r>
               <a:rPr lang="en-US" sz="2800" dirty="0"/>
@@ -15263,12 +15350,20 @@
           </a:p>
           <a:p>
             <a:r>
-              <a:rPr lang="en-US" sz="2800" dirty="0" err="1" smtClean="0"/>
+              <a:rPr lang="en-US" sz="2800" dirty="0" smtClean="0"/>
               <a:t>Vipul</a:t>
             </a:r>
             <a:r>
               <a:rPr lang="en-US" sz="2800" dirty="0" smtClean="0"/>
-              <a:t>					GUI</a:t>
+              <a:t> </a:t>
+            </a:r>
+            <a:r>
+              <a:rPr lang="en-US" sz="2800" dirty="0" smtClean="0"/>
+              <a:t>Kohli</a:t>
+            </a:r>
+            <a:r>
+              <a:rPr lang="en-US" sz="2800" dirty="0" smtClean="0"/>
+              <a:t>				GUI</a:t>
             </a:r>
             <a:endParaRPr lang="en-US" sz="2800" dirty="0"/>
           </a:p>
@@ -15390,62 +15485,131 @@
             <a:pPr indent="-342900"/>
             <a:r>
               <a:rPr lang="en-US" sz="2200" dirty="0" smtClean="0"/>
-              <a:t>What?</a:t>
-            </a:r>
-          </a:p>
-          <a:p>
-            <a:pPr marL="0" indent="0">
-              <a:buNone/>
-            </a:pPr>
+              <a:t>What</a:t>
+            </a:r>
+            <a:r>
+              <a:rPr lang="en-US" sz="2200" dirty="0" smtClean="0"/>
+              <a:t>?</a:t>
+            </a:r>
+          </a:p>
+          <a:p>
+            <a:pPr lvl="1" indent="-342900"/>
+            <a:r>
+              <a:rPr lang="en-US" sz="1700" dirty="0" smtClean="0"/>
+              <a:t>An image</a:t>
+            </a:r>
+            <a:r>
+              <a:rPr lang="en-US" sz="1700" dirty="0" smtClean="0"/>
+              <a:t>-based</a:t>
+            </a:r>
+            <a:r>
+              <a:rPr lang="en-US" sz="1700" dirty="0" smtClean="0"/>
+              <a:t>, </a:t>
+            </a:r>
+            <a:r>
+              <a:rPr lang="en-US" sz="1700" dirty="0" smtClean="0"/>
+              <a:t>academic</a:t>
+            </a:r>
             <a:r>
               <a:rPr lang="en-US" sz="1700" dirty="0"/>
-              <a:t>	</a:t>
-            </a:r>
-            <a:r>
-              <a:rPr lang="en-US" sz="2100" dirty="0" smtClean="0"/>
-              <a:t>We will be creating a picture based, academic, question and 	answer software application. </a:t>
+              <a:t> </a:t>
+            </a:r>
+            <a:r>
+              <a:rPr lang="en-US" sz="1700" dirty="0" smtClean="0"/>
+              <a:t>Q&amp;A</a:t>
+            </a:r>
+            <a:r>
+              <a:rPr lang="en-US" sz="1700" dirty="0" smtClean="0"/>
+              <a:t> </a:t>
+            </a:r>
+            <a:r>
+              <a:rPr lang="en-US" sz="1700" dirty="0" smtClean="0"/>
+              <a:t>software application. </a:t>
             </a:r>
           </a:p>
           <a:p>
             <a:pPr indent="-342900"/>
             <a:r>
               <a:rPr lang="en-US" sz="2200" dirty="0" smtClean="0"/>
-              <a:t>Why?</a:t>
-            </a:r>
-          </a:p>
-          <a:p>
-            <a:pPr marL="0" indent="0">
-              <a:buNone/>
-            </a:pPr>
+              <a:t>Why</a:t>
+            </a:r>
+            <a:r>
+              <a:rPr lang="en-US" sz="2200" dirty="0" smtClean="0"/>
+              <a:t>?</a:t>
+            </a:r>
+          </a:p>
+          <a:p>
+            <a:pPr lvl="1" indent="-342900"/>
             <a:r>
               <a:rPr lang="en-US" dirty="0" smtClean="0"/>
-              <a:t>	To aid in a students ability to post on a Q&amp;A forum through the 	use of photos.</a:t>
+              <a:t>To </a:t>
+            </a:r>
+            <a:r>
+              <a:rPr lang="en-US" dirty="0" smtClean="0"/>
+              <a:t>aid in a </a:t>
+            </a:r>
+            <a:r>
+              <a:rPr lang="en-US" dirty="0" smtClean="0"/>
+              <a:t>student’s </a:t>
+            </a:r>
+            <a:r>
+              <a:rPr lang="en-US" dirty="0" smtClean="0"/>
+              <a:t>ability to post on a Q&amp;A forum through the </a:t>
+            </a:r>
+            <a:r>
+              <a:rPr lang="en-US" dirty="0" smtClean="0"/>
+              <a:t>use </a:t>
+            </a:r>
+            <a:r>
+              <a:rPr lang="en-US" dirty="0" smtClean="0"/>
+              <a:t>of photos.</a:t>
             </a:r>
           </a:p>
           <a:p>
             <a:pPr indent="-342900"/>
             <a:r>
               <a:rPr lang="en-US" sz="2200" dirty="0" smtClean="0"/>
-              <a:t>How?</a:t>
-            </a:r>
-          </a:p>
-          <a:p>
-            <a:pPr marL="0" indent="0">
-              <a:buNone/>
-            </a:pPr>
-            <a:r>
-              <a:rPr lang="en-US" dirty="0"/>
-              <a:t>	</a:t>
-            </a:r>
+              <a:t>How</a:t>
+            </a:r>
+            <a:r>
+              <a:rPr lang="en-US" sz="2200" dirty="0" smtClean="0"/>
+              <a:t>?</a:t>
+            </a:r>
+          </a:p>
+          <a:p>
+            <a:pPr lvl="1" indent="-342900"/>
             <a:r>
               <a:rPr lang="en-US" dirty="0" smtClean="0"/>
-              <a:t>The use of photos to ask questions will aid the user by eliminating 	the typing of complex symbols and graphs that may accompany an 	academic question. </a:t>
-            </a:r>
-          </a:p>
-          <a:p>
-            <a:pPr marL="0" indent="0">
-              <a:buNone/>
-            </a:pPr>
+              <a:t>Photo-based Q&amp;A will </a:t>
+            </a:r>
+            <a:r>
+              <a:rPr lang="en-US" dirty="0" smtClean="0"/>
+              <a:t>aid the user by eliminating </a:t>
+            </a:r>
+            <a:r>
+              <a:rPr lang="en-US" dirty="0" smtClean="0"/>
+              <a:t>typing of symbols or graphs </a:t>
+            </a:r>
+            <a:r>
+              <a:rPr lang="en-US" dirty="0" smtClean="0"/>
+              <a:t>that may accompany an </a:t>
+            </a:r>
+            <a:r>
+              <a:rPr lang="en-US" dirty="0" smtClean="0"/>
+              <a:t>academic </a:t>
+            </a:r>
+            <a:r>
+              <a:rPr lang="en-US" dirty="0" smtClean="0"/>
+              <a:t>question. </a:t>
+            </a:r>
+            <a:endParaRPr lang="en-US" dirty="0"/>
+          </a:p>
+          <a:p>
+            <a:pPr indent="-342900"/>
+            <a:r>
+              <a:rPr lang="en-US" dirty="0" smtClean="0"/>
+              <a:t>Snap-2-Ask makes outsourcing a question faster and easier than ever.</a:t>
+            </a:r>
             <a:endParaRPr lang="en-US" dirty="0"/>
           </a:p>
         </p:txBody>
@@ -15535,94 +15699,96 @@
           <a:p>
             <a:pPr indent="-342900"/>
             <a:r>
-              <a:rPr lang="en-US" sz="2200" dirty="0" smtClean="0"/>
-              <a:t>Android Application</a:t>
+              <a:rPr lang="en-US" sz="2800" dirty="0" smtClean="0"/>
+              <a:t>Android </a:t>
+            </a:r>
+            <a:r>
+              <a:rPr lang="en-US" sz="2800" dirty="0" smtClean="0"/>
+              <a:t>Application – For Students</a:t>
             </a:r>
           </a:p>
           <a:p>
             <a:pPr lvl="2" indent="-342900"/>
             <a:r>
-              <a:rPr lang="en-US" sz="2000" dirty="0"/>
-              <a:t>Simple and to the point. The app will open up with a camera,  </a:t>
-            </a:r>
-            <a:r>
               <a:rPr lang="en-US" sz="2000" dirty="0" smtClean="0"/>
-              <a:t>letting </a:t>
-            </a:r>
-            <a:r>
-              <a:rPr lang="en-US" sz="2000" dirty="0"/>
-              <a:t>the user quickly take a photo of the question they may </a:t>
-            </a:r>
+              <a:t>Student opens app and sees camera view.</a:t>
+            </a:r>
+            <a:endParaRPr lang="en-US" sz="2000" dirty="0" smtClean="0"/>
+          </a:p>
+          <a:p>
+            <a:pPr lvl="2" indent="-342900"/>
             <a:r>
               <a:rPr lang="en-US" sz="2000" dirty="0" smtClean="0"/>
-              <a:t>need </a:t>
-            </a:r>
-            <a:r>
-              <a:rPr lang="en-US" sz="2000" dirty="0"/>
-              <a:t>help on. </a:t>
+              <a:t>Student</a:t>
+            </a:r>
+            <a:r>
+              <a:rPr lang="en-US" sz="2000" dirty="0" smtClean="0"/>
+              <a:t> quickly “snaps” and sends </a:t>
+            </a:r>
+            <a:r>
+              <a:rPr lang="en-US" sz="2000" dirty="0" smtClean="0"/>
+              <a:t>a question</a:t>
+            </a:r>
+            <a:r>
+              <a:rPr lang="en-US" sz="2000" dirty="0" smtClean="0"/>
+              <a:t>. </a:t>
             </a:r>
             <a:endParaRPr lang="en-US" sz="2000" dirty="0" smtClean="0"/>
           </a:p>
           <a:p>
             <a:pPr lvl="2" indent="-342900"/>
             <a:r>
-              <a:rPr lang="en-US" sz="2000" dirty="0"/>
-              <a:t>Will be focused on posting, though also have basic abilities to </a:t>
-            </a:r>
-            <a:r>
               <a:rPr lang="en-US" sz="2000" dirty="0" smtClean="0"/>
-              <a:t>browse and </a:t>
-            </a:r>
+              <a:t>Student notified when question is answered.</a:t>
+            </a:r>
+          </a:p>
+          <a:p>
+            <a:pPr lvl="2" indent="-342900"/>
             <a:r>
               <a:rPr lang="en-US" sz="2000" dirty="0" smtClean="0"/>
-              <a:t>answer</a:t>
+              <a:t>Student views and rates answer(s).</a:t>
             </a:r>
             <a:endParaRPr lang="en-US" sz="2000" dirty="0" smtClean="0"/>
           </a:p>
           <a:p>
             <a:pPr indent="-342900"/>
             <a:r>
-              <a:rPr lang="en-US" sz="2200" dirty="0" smtClean="0"/>
-              <a:t>Website</a:t>
-            </a:r>
+              <a:rPr lang="en-US" sz="2600" dirty="0" smtClean="0"/>
+              <a:t> </a:t>
+            </a:r>
+            <a:r>
+              <a:rPr lang="en-US" sz="2800" dirty="0" smtClean="0"/>
+              <a:t>Website – For Answerers</a:t>
+            </a:r>
+            <a:endParaRPr lang="en-US" sz="2800" dirty="0" smtClean="0"/>
           </a:p>
           <a:p>
             <a:pPr lvl="2" indent="-342900"/>
             <a:r>
-              <a:rPr lang="en-US" sz="2000" dirty="0"/>
-              <a:t>A user efficient navigation system which allows for the </a:t>
-            </a:r>
-            <a:r>
               <a:rPr lang="en-US" sz="2000" dirty="0" smtClean="0"/>
-              <a:t>browsing and </a:t>
-            </a:r>
-            <a:r>
-              <a:rPr lang="en-US" sz="2000" dirty="0"/>
-              <a:t>answering of questions</a:t>
+              <a:t>Answerer opens site and sees </a:t>
             </a:r>
             <a:r>
               <a:rPr lang="en-US" sz="2000" dirty="0" smtClean="0"/>
-              <a:t>.</a:t>
-            </a:r>
-            <a:endParaRPr lang="en-US" sz="2000" dirty="0"/>
+              <a:t>array of questions.</a:t>
+            </a:r>
           </a:p>
           <a:p>
             <a:pPr lvl="2" indent="-342900"/>
             <a:r>
-              <a:rPr lang="en-US" sz="2000" dirty="0"/>
-              <a:t>It will focus on </a:t>
-            </a:r>
-            <a:r>
               <a:rPr lang="en-US" sz="2000" dirty="0" smtClean="0"/>
-              <a:t>asking and answering question, </a:t>
-            </a:r>
-            <a:r>
-              <a:rPr lang="en-US" sz="2000" dirty="0"/>
-              <a:t>though </a:t>
+              <a:t>Answerer chooses question by category, at random, or </a:t>
             </a:r>
             <a:r>
               <a:rPr lang="en-US" sz="2000" dirty="0" smtClean="0"/>
-              <a:t>other functionality will also be implemented.</a:t>
+              <a:t>unanswered.</a:t>
+            </a:r>
+          </a:p>
+          <a:p>
+            <a:pPr lvl="2" indent="-342900"/>
+            <a:r>
+              <a:rPr lang="en-US" sz="2000" dirty="0" smtClean="0"/>
+              <a:t>Answerer answers, gets rated.</a:t>
             </a:r>
             <a:endParaRPr lang="en-US" sz="2000" dirty="0"/>
           </a:p>
@@ -15698,7 +15864,7 @@
         <p:spPr/>
         <p:txBody>
           <a:bodyPr>
-            <a:normAutofit lnSpcReduction="10000"/>
+            <a:normAutofit fontScale="92500" lnSpcReduction="10000"/>
           </a:bodyPr>
           <a:lstStyle/>
           <a:p>
@@ -15714,7 +15880,15 @@
             <a:pPr lvl="2"/>
             <a:r>
               <a:rPr lang="en-US" sz="2000" dirty="0"/>
-              <a:t>We will draw upon your skills acquired through Database </a:t>
+              <a:t>We will draw upon </a:t>
+            </a:r>
+            <a:r>
+              <a:rPr lang="en-US" sz="2000" dirty="0" smtClean="0"/>
+              <a:t>skills </a:t>
+            </a:r>
+            <a:r>
+              <a:rPr lang="en-US" sz="2000" dirty="0"/>
+              <a:t>acquired through Database </a:t>
             </a:r>
             <a:r>
               <a:rPr lang="en-US" sz="2000" dirty="0" smtClean="0"/>
@@ -15722,11 +15896,19 @@
             </a:r>
             <a:r>
               <a:rPr lang="en-US" sz="2000" dirty="0"/>
-              <a:t>by creating and managing our database, including </a:t>
+              <a:t>by creating and managing </a:t>
             </a:r>
             <a:r>
               <a:rPr lang="en-US" sz="2000" dirty="0" smtClean="0"/>
-              <a:t>students </a:t>
+              <a:t>a database</a:t>
+            </a:r>
+            <a:r>
+              <a:rPr lang="en-US" sz="2000" dirty="0"/>
+              <a:t>, including </a:t>
+            </a:r>
+            <a:r>
+              <a:rPr lang="en-US" sz="2000" dirty="0" smtClean="0"/>
+              <a:t>tables for students </a:t>
             </a:r>
             <a:r>
               <a:rPr lang="en-US" sz="2000" dirty="0"/>
@@ -15757,24 +15939,21 @@
             <a:pPr lvl="2"/>
             <a:r>
               <a:rPr lang="en-US" sz="2000" dirty="0"/>
-              <a:t>We will use our abilities gained from GUI Class by implementing a </a:t>
+              <a:t>We will use our abilities gained from GUI </a:t>
             </a:r>
             <a:r>
               <a:rPr lang="en-US" sz="2000" dirty="0" smtClean="0"/>
-              <a:t>user </a:t>
+              <a:t>by </a:t>
             </a:r>
             <a:r>
               <a:rPr lang="en-US" sz="2000" dirty="0"/>
-              <a:t>efficient website and android application that is user friendly </a:t>
+              <a:t>implementing </a:t>
             </a:r>
             <a:r>
               <a:rPr lang="en-US" sz="2000" dirty="0" smtClean="0"/>
-              <a:t>and </a:t>
-            </a:r>
-            <a:r>
-              <a:rPr lang="en-US" sz="2000" dirty="0" smtClean="0"/>
-              <a:t>quick.</a:t>
-            </a:r>
+              <a:t>a simple and fast mobile app for students and a clear web interface for tutors.</a:t>
+            </a:r>
+            <a:endParaRPr lang="en-US" sz="2000" dirty="0" smtClean="0"/>
           </a:p>
           <a:p>
             <a:pPr marL="68580" indent="0">
@@ -15922,7 +16101,7 @@
           <a:p>
             <a:pPr lvl="1"/>
             <a:r>
-              <a:rPr lang="en-US" sz="1800" dirty="0" err="1" smtClean="0"/>
+              <a:rPr lang="en-US" sz="1800" dirty="0" smtClean="0"/>
               <a:t>Tutor.com</a:t>
             </a:r>
             <a:r>
@@ -15930,7 +16109,7 @@
               <a:t>, Growing stars, </a:t>
             </a:r>
             <a:r>
-              <a:rPr lang="en-US" sz="1800" dirty="0" err="1" smtClean="0"/>
+              <a:rPr lang="en-US" sz="1800" dirty="0" smtClean="0"/>
               <a:t>TutorVista</a:t>
             </a:r>
             <a:r>
@@ -15938,7 +16117,7 @@
               <a:t>, </a:t>
             </a:r>
             <a:r>
-              <a:rPr lang="en-US" sz="1800" dirty="0" err="1" smtClean="0"/>
+              <a:rPr lang="en-US" sz="1800" dirty="0" smtClean="0"/>
               <a:t>eTutorWorld</a:t>
             </a:r>
             <a:r>
@@ -16212,11 +16391,15 @@
           <a:p>
             <a:r>
               <a:rPr lang="en-US" dirty="0" smtClean="0"/>
-              <a:t>Product </a:t>
+              <a:t>Product Features  </a:t>
             </a:r>
             <a:r>
               <a:rPr lang="en-US" dirty="0" smtClean="0"/>
-              <a:t>Features   version 1.0</a:t>
+              <a:t>version </a:t>
+            </a:r>
+            <a:r>
+              <a:rPr lang="en-US" dirty="0" smtClean="0"/>
+              <a:t>1.0</a:t>
             </a:r>
             <a:endParaRPr lang="en-US" dirty="0"/>
           </a:p>
@@ -16244,9 +16427,6 @@
           </a:bodyPr>
           <a:lstStyle/>
           <a:p>
-            <a:endParaRPr lang="es-ES" dirty="0" smtClean="0"/>
-          </a:p>
-          <a:p>
             <a:r>
               <a:rPr lang="en-US" sz="2400" dirty="0" smtClean="0"/>
               <a:t>Students</a:t>
@@ -16256,72 +16436,108 @@
               <a:t> </a:t>
             </a:r>
             <a:r>
+              <a:rPr lang="es-ES" sz="2400" dirty="0" smtClean="0"/>
+              <a:t>will</a:t>
+            </a:r>
+            <a:r>
+              <a:rPr lang="es-ES" sz="2400" dirty="0" smtClean="0"/>
+              <a:t> </a:t>
+            </a:r>
+            <a:r>
+              <a:rPr lang="es-ES" sz="2400" dirty="0" smtClean="0"/>
+              <a:t>have</a:t>
+            </a:r>
+            <a:r>
+              <a:rPr lang="es-ES" sz="2400" dirty="0" smtClean="0"/>
+              <a:t> </a:t>
+            </a:r>
+            <a:r>
+              <a:rPr lang="es-ES" sz="2400" dirty="0" smtClean="0"/>
+              <a:t>account</a:t>
+            </a:r>
+            <a:r>
+              <a:rPr lang="es-ES" sz="2400" dirty="0" smtClean="0"/>
+              <a:t>s</a:t>
+            </a:r>
+            <a:r>
+              <a:rPr lang="es-ES" sz="2400" dirty="0" smtClean="0"/>
+              <a:t> and </a:t>
+            </a:r>
+            <a:r>
               <a:rPr lang="en-US" sz="2400" dirty="0" smtClean="0"/>
-              <a:t>will be able to ask questions by uploading a picture, </a:t>
+              <a:t>be </a:t>
             </a:r>
             <a:r>
               <a:rPr lang="en-US" sz="2400" dirty="0" smtClean="0"/>
-              <a:t>an optional description of the question, </a:t>
+              <a:t>able to ask questions by </a:t>
             </a:r>
             <a:r>
               <a:rPr lang="en-US" sz="2400" dirty="0" smtClean="0"/>
-              <a:t>and the category to which the question belongs.</a:t>
-            </a:r>
-          </a:p>
-          <a:p>
+              <a:t>uploading:</a:t>
+            </a:r>
+          </a:p>
+          <a:p>
+            <a:pPr lvl="1"/>
+            <a:r>
+              <a:rPr lang="en-US" dirty="0"/>
+              <a:t>A</a:t>
+            </a:r>
+            <a:r>
+              <a:rPr lang="en-US" dirty="0" smtClean="0"/>
+              <a:t> picture</a:t>
+            </a:r>
+          </a:p>
+          <a:p>
+            <a:pPr lvl="1"/>
+            <a:r>
+              <a:rPr lang="en-US" dirty="0" smtClean="0"/>
+              <a:t>A category to which the question belongs</a:t>
+            </a:r>
+          </a:p>
+          <a:p>
+            <a:pPr lvl="1"/>
+            <a:r>
+              <a:rPr lang="en-US" dirty="0" smtClean="0"/>
+              <a:t>An</a:t>
+            </a:r>
+            <a:r>
+              <a:rPr lang="en-US" dirty="0" smtClean="0"/>
+              <a:t> </a:t>
+            </a:r>
+            <a:r>
+              <a:rPr lang="en-US" dirty="0" smtClean="0"/>
+              <a:t>optional description of the </a:t>
+            </a:r>
+            <a:r>
+              <a:rPr lang="en-US" dirty="0" smtClean="0"/>
+              <a:t>question</a:t>
+            </a:r>
             <a:endParaRPr lang="en-US" sz="2400" dirty="0" smtClean="0"/>
           </a:p>
           <a:p>
             <a:r>
               <a:rPr lang="en-US" sz="2400" dirty="0" smtClean="0"/>
-              <a:t>Tutors  will answer the question </a:t>
+              <a:t>Answerers will have accounts and be able to answer questions </a:t>
             </a:r>
             <a:r>
               <a:rPr lang="en-US" sz="2400" dirty="0" smtClean="0"/>
-              <a:t>through text.</a:t>
-            </a:r>
-            <a:endParaRPr lang="en-US" sz="2000" dirty="0" smtClean="0"/>
-          </a:p>
-          <a:p>
-            <a:pPr lvl="2"/>
-            <a:r>
-              <a:rPr lang="en-US" sz="2000" dirty="0" smtClean="0"/>
-              <a:t>Tutor: registered college </a:t>
-            </a:r>
-            <a:r>
-              <a:rPr lang="en-US" sz="2000" dirty="0" smtClean="0"/>
-              <a:t>students (minimum GPA of 3.2) </a:t>
-            </a:r>
-            <a:r>
-              <a:rPr lang="en-US" sz="2000" dirty="0" smtClean="0"/>
-              <a:t>or teachers.  Tutors will </a:t>
-            </a:r>
-            <a:r>
-              <a:rPr lang="en-US" sz="2000" dirty="0" smtClean="0"/>
-              <a:t>be associate with their </a:t>
-            </a:r>
-            <a:r>
-              <a:rPr lang="en-US" sz="2000" dirty="0" smtClean="0"/>
-              <a:t>contact information (location and email) and </a:t>
-            </a:r>
-            <a:r>
-              <a:rPr lang="en-US" sz="2000" dirty="0" smtClean="0"/>
-              <a:t>their </a:t>
-            </a:r>
-            <a:r>
-              <a:rPr lang="en-US" sz="2000" dirty="0" smtClean="0"/>
-              <a:t>rate.</a:t>
-            </a:r>
-          </a:p>
-          <a:p>
-            <a:pPr marL="68580" indent="0">
-              <a:buNone/>
-            </a:pPr>
-            <a:r>
-              <a:rPr lang="en-US" dirty="0" smtClean="0"/>
-              <a:t>	</a:t>
-            </a:r>
-            <a:endParaRPr lang="en-US" dirty="0"/>
+              <a:t>through </a:t>
+            </a:r>
+            <a:r>
+              <a:rPr lang="en-US" sz="2400" dirty="0" smtClean="0"/>
+              <a:t>text.</a:t>
+            </a:r>
+          </a:p>
+          <a:p>
+            <a:r>
+              <a:rPr lang="en-US" sz="2400" dirty="0"/>
+              <a:t>A</a:t>
+            </a:r>
+            <a:r>
+              <a:rPr lang="en-US" sz="2400" dirty="0" smtClean="0"/>
+              <a:t>nswerer will have a publicly viewable rating.</a:t>
+            </a:r>
+            <a:endParaRPr lang="en-US" sz="2400" dirty="0"/>
           </a:p>
           <a:p>
             <a:endParaRPr lang="en-US" dirty="0" smtClean="0"/>
@@ -16386,11 +16602,11 @@
           <a:p>
             <a:r>
               <a:rPr lang="en-US" dirty="0" smtClean="0"/>
-              <a:t>PRODUCT FEATURES </a:t>
+              <a:t>PRODUCT FEATURES  </a:t>
             </a:r>
             <a:r>
               <a:rPr lang="en-US" dirty="0" smtClean="0"/>
-              <a:t> version1.0</a:t>
+              <a:t>version 1.0</a:t>
             </a:r>
             <a:endParaRPr lang="en-US" dirty="0"/>
           </a:p>
@@ -16408,19 +16624,15 @@
         </p:nvSpPr>
         <p:spPr>
           <a:xfrm>
-            <a:off x="685800" y="1252959"/>
+            <a:off x="685800" y="1519659"/>
             <a:ext cx="7772400" cy="4221865"/>
           </a:xfrm>
         </p:spPr>
         <p:txBody>
-          <a:bodyPr/>
+          <a:bodyPr>
+            <a:normAutofit/>
+          </a:bodyPr>
           <a:lstStyle/>
-          <a:p>
-            <a:pPr marL="68580" indent="0">
-              <a:buNone/>
-            </a:pPr>
-            <a:endParaRPr lang="en-US" dirty="0"/>
-          </a:p>
           <a:p>
             <a:r>
               <a:rPr lang="en-US" sz="2400" dirty="0" smtClean="0"/>
@@ -16436,26 +16648,88 @@
             </a:r>
             <a:r>
               <a:rPr lang="en-US" sz="2400" dirty="0" smtClean="0"/>
-              <a:t>The rating of the tutor will be calculate based on the rate of his/her answers and the total number of questions answered. </a:t>
-            </a:r>
-            <a:endParaRPr lang="en-US" sz="2400" dirty="0" smtClean="0"/>
-          </a:p>
-          <a:p>
+              <a:t> </a:t>
+            </a:r>
+          </a:p>
+          <a:p>
+            <a:pPr lvl="1"/>
+            <a:r>
+              <a:rPr lang="en-US" dirty="0" smtClean="0"/>
+              <a:t>Answerer </a:t>
+            </a:r>
+            <a:r>
+              <a:rPr lang="en-US" dirty="0" smtClean="0"/>
+              <a:t>rating will </a:t>
+            </a:r>
+            <a:r>
+              <a:rPr lang="en-US" dirty="0" smtClean="0"/>
+              <a:t>be </a:t>
+            </a:r>
+            <a:r>
+              <a:rPr lang="en-US" dirty="0" smtClean="0"/>
+              <a:t>calculated from </a:t>
+            </a:r>
+            <a:r>
+              <a:rPr lang="en-US" dirty="0" smtClean="0"/>
+              <a:t>average </a:t>
+            </a:r>
+            <a:r>
+              <a:rPr lang="en-US" dirty="0" smtClean="0"/>
+              <a:t>of </a:t>
+            </a:r>
+            <a:r>
+              <a:rPr lang="en-US" dirty="0" smtClean="0"/>
+              <a:t>their </a:t>
+            </a:r>
+            <a:r>
+              <a:rPr lang="en-US" dirty="0" smtClean="0"/>
+              <a:t>answer rankings </a:t>
+            </a:r>
+            <a:r>
+              <a:rPr lang="en-US" dirty="0" smtClean="0"/>
+              <a:t>and </a:t>
+            </a:r>
+            <a:r>
+              <a:rPr lang="en-US" dirty="0" smtClean="0"/>
+              <a:t>total </a:t>
+            </a:r>
+            <a:r>
+              <a:rPr lang="en-US" dirty="0" smtClean="0"/>
+              <a:t>number of questions answered. </a:t>
+            </a:r>
             <a:endParaRPr lang="en-US" sz="2400" dirty="0"/>
           </a:p>
           <a:p>
             <a:r>
               <a:rPr lang="en-US" sz="2400" dirty="0" smtClean="0"/>
-              <a:t>Students will be able to search for tutors who live near their location.</a:t>
-            </a:r>
-          </a:p>
-          <a:p>
+              <a:t>Students will be able to search for </a:t>
+            </a:r>
+            <a:r>
+              <a:rPr lang="en-US" sz="2400" dirty="0" smtClean="0"/>
+              <a:t>answerers who </a:t>
+            </a:r>
+            <a:r>
+              <a:rPr lang="en-US" sz="2400" dirty="0" smtClean="0"/>
+              <a:t>live </a:t>
+            </a:r>
+            <a:r>
+              <a:rPr lang="en-US" sz="2400" dirty="0" smtClean="0"/>
+              <a:t>nearby.</a:t>
+            </a:r>
             <a:endParaRPr lang="en-US" sz="2400" dirty="0"/>
           </a:p>
           <a:p>
             <a:r>
               <a:rPr lang="en-US" sz="2400" dirty="0" smtClean="0"/>
-              <a:t>Students will have access to all the questions/answers they did.</a:t>
+              <a:t>Students will have access to </a:t>
+            </a:r>
+            <a:r>
+              <a:rPr lang="en-US" sz="2400" dirty="0" smtClean="0"/>
+              <a:t>their own Q&amp;A history</a:t>
+            </a:r>
+            <a:r>
+              <a:rPr lang="en-US" sz="2400" dirty="0" smtClean="0"/>
+              <a:t>.</a:t>
             </a:r>
             <a:endParaRPr lang="en-US" sz="2400" dirty="0"/>
           </a:p>

</xml_diff>